<commit_message>
Changes Sequence Diagram for DG & shifted and aligned features in DG
</commit_message>
<xml_diff>
--- a/docs/MarkUnmark.pptx
+++ b/docs/MarkUnmark.pptx
@@ -9,7 +9,7 @@
   </p:notesMasterIdLst>
   <p:sldIdLst>
     <p:sldId id="269" r:id="rId2"/>
-    <p:sldId id="270" r:id="rId3"/>
+    <p:sldId id="271" r:id="rId3"/>
   </p:sldIdLst>
   <p:sldSz cx="9144000" cy="6858000" type="screen4x3"/>
   <p:notesSz cx="7315200" cy="9601200"/>
@@ -130,7 +130,7 @@
 <file path=ppt/revisionInfo.xml><?xml version="1.0" encoding="utf-8"?>
 <p1510:revInfo xmlns:a="http://schemas.openxmlformats.org/drawingml/2006/main" xmlns:r="http://schemas.openxmlformats.org/officeDocument/2006/relationships" xmlns:p1510="http://schemas.microsoft.com/office/powerpoint/2015/10/main">
   <p1510:revLst>
-    <p1510:client id="{399B34CB-0DE2-46F2-B8AA-609D3AE22DA7}" v="126" dt="2020-03-23T06:35:26.655"/>
+    <p1510:client id="{A706477B-DE66-4372-985B-D78DB1612323}" v="11" dt="2020-04-02T13:22:13.074"/>
   </p1510:revLst>
 </p1510:revInfo>
 </file>
@@ -503,6 +503,412 @@
       </pc:sldChg>
     </pc:docChg>
   </pc:docChgLst>
+  <pc:docChgLst>
+    <pc:chgData name="Shannon Wong" userId="8c83f3d3550a5322" providerId="LiveId" clId="{A706477B-DE66-4372-985B-D78DB1612323}"/>
+    <pc:docChg chg="undo custSel addSld delSld modSld">
+      <pc:chgData name="Shannon Wong" userId="8c83f3d3550a5322" providerId="LiveId" clId="{A706477B-DE66-4372-985B-D78DB1612323}" dt="2020-04-02T13:25:32.308" v="151" actId="14100"/>
+      <pc:docMkLst>
+        <pc:docMk/>
+      </pc:docMkLst>
+      <pc:sldChg chg="addSp delSp modSp delAnim modAnim">
+        <pc:chgData name="Shannon Wong" userId="8c83f3d3550a5322" providerId="LiveId" clId="{A706477B-DE66-4372-985B-D78DB1612323}" dt="2020-04-02T13:24:00.286" v="141" actId="14100"/>
+        <pc:sldMkLst>
+          <pc:docMk/>
+          <pc:sldMk cId="3228498101" sldId="269"/>
+        </pc:sldMkLst>
+        <pc:spChg chg="mod">
+          <ac:chgData name="Shannon Wong" userId="8c83f3d3550a5322" providerId="LiveId" clId="{A706477B-DE66-4372-985B-D78DB1612323}" dt="2020-04-02T13:22:03.994" v="132" actId="14100"/>
+          <ac:spMkLst>
+            <pc:docMk/>
+            <pc:sldMk cId="3228498101" sldId="269"/>
+            <ac:spMk id="5" creationId="{00000000-0000-0000-0000-000000000000}"/>
+          </ac:spMkLst>
+        </pc:spChg>
+        <pc:spChg chg="del">
+          <ac:chgData name="Shannon Wong" userId="8c83f3d3550a5322" providerId="LiveId" clId="{A706477B-DE66-4372-985B-D78DB1612323}" dt="2020-04-02T12:37:56.296" v="59" actId="478"/>
+          <ac:spMkLst>
+            <pc:docMk/>
+            <pc:sldMk cId="3228498101" sldId="269"/>
+            <ac:spMk id="17" creationId="{00000000-0000-0000-0000-000000000000}"/>
+          </ac:spMkLst>
+        </pc:spChg>
+        <pc:spChg chg="mod">
+          <ac:chgData name="Shannon Wong" userId="8c83f3d3550a5322" providerId="LiveId" clId="{A706477B-DE66-4372-985B-D78DB1612323}" dt="2020-04-02T13:23:20.935" v="137" actId="14100"/>
+          <ac:spMkLst>
+            <pc:docMk/>
+            <pc:sldMk cId="3228498101" sldId="269"/>
+            <ac:spMk id="19" creationId="{00000000-0000-0000-0000-000000000000}"/>
+          </ac:spMkLst>
+        </pc:spChg>
+        <pc:spChg chg="mod">
+          <ac:chgData name="Shannon Wong" userId="8c83f3d3550a5322" providerId="LiveId" clId="{A706477B-DE66-4372-985B-D78DB1612323}" dt="2020-04-02T13:24:00.286" v="141" actId="14100"/>
+          <ac:spMkLst>
+            <pc:docMk/>
+            <pc:sldMk cId="3228498101" sldId="269"/>
+            <ac:spMk id="20" creationId="{00000000-0000-0000-0000-000000000000}"/>
+          </ac:spMkLst>
+        </pc:spChg>
+        <pc:spChg chg="mod">
+          <ac:chgData name="Shannon Wong" userId="8c83f3d3550a5322" providerId="LiveId" clId="{A706477B-DE66-4372-985B-D78DB1612323}" dt="2020-04-02T12:36:50.951" v="53" actId="1076"/>
+          <ac:spMkLst>
+            <pc:docMk/>
+            <pc:sldMk cId="3228498101" sldId="269"/>
+            <ac:spMk id="21" creationId="{00000000-0000-0000-0000-000000000000}"/>
+          </ac:spMkLst>
+        </pc:spChg>
+        <pc:spChg chg="mod">
+          <ac:chgData name="Shannon Wong" userId="8c83f3d3550a5322" providerId="LiveId" clId="{A706477B-DE66-4372-985B-D78DB1612323}" dt="2020-04-02T13:23:55.040" v="140" actId="14100"/>
+          <ac:spMkLst>
+            <pc:docMk/>
+            <pc:sldMk cId="3228498101" sldId="269"/>
+            <ac:spMk id="24" creationId="{00000000-0000-0000-0000-000000000000}"/>
+          </ac:spMkLst>
+        </pc:spChg>
+        <pc:spChg chg="add mod">
+          <ac:chgData name="Shannon Wong" userId="8c83f3d3550a5322" providerId="LiveId" clId="{A706477B-DE66-4372-985B-D78DB1612323}" dt="2020-04-02T13:22:40.346" v="136" actId="14100"/>
+          <ac:spMkLst>
+            <pc:docMk/>
+            <pc:sldMk cId="3228498101" sldId="269"/>
+            <ac:spMk id="30" creationId="{E61F55CE-8BAB-4C52-8D9F-72914F7709D0}"/>
+          </ac:spMkLst>
+        </pc:spChg>
+        <pc:spChg chg="add mod">
+          <ac:chgData name="Shannon Wong" userId="8c83f3d3550a5322" providerId="LiveId" clId="{A706477B-DE66-4372-985B-D78DB1612323}" dt="2020-04-02T13:22:40.346" v="136" actId="14100"/>
+          <ac:spMkLst>
+            <pc:docMk/>
+            <pc:sldMk cId="3228498101" sldId="269"/>
+            <ac:spMk id="31" creationId="{A46E2A60-C793-4B50-A5C3-6230067649BA}"/>
+          </ac:spMkLst>
+        </pc:spChg>
+        <pc:spChg chg="mod">
+          <ac:chgData name="Shannon Wong" userId="8c83f3d3550a5322" providerId="LiveId" clId="{A706477B-DE66-4372-985B-D78DB1612323}" dt="2020-04-02T13:23:26.407" v="138" actId="14100"/>
+          <ac:spMkLst>
+            <pc:docMk/>
+            <pc:sldMk cId="3228498101" sldId="269"/>
+            <ac:spMk id="33" creationId="{00000000-0000-0000-0000-000000000000}"/>
+          </ac:spMkLst>
+        </pc:spChg>
+        <pc:spChg chg="mod">
+          <ac:chgData name="Shannon Wong" userId="8c83f3d3550a5322" providerId="LiveId" clId="{A706477B-DE66-4372-985B-D78DB1612323}" dt="2020-04-02T13:22:40.346" v="136" actId="14100"/>
+          <ac:spMkLst>
+            <pc:docMk/>
+            <pc:sldMk cId="3228498101" sldId="269"/>
+            <ac:spMk id="34" creationId="{00000000-0000-0000-0000-000000000000}"/>
+          </ac:spMkLst>
+        </pc:spChg>
+        <pc:spChg chg="mod">
+          <ac:chgData name="Shannon Wong" userId="8c83f3d3550a5322" providerId="LiveId" clId="{A706477B-DE66-4372-985B-D78DB1612323}" dt="2020-04-02T13:22:40.346" v="136" actId="14100"/>
+          <ac:spMkLst>
+            <pc:docMk/>
+            <pc:sldMk cId="3228498101" sldId="269"/>
+            <ac:spMk id="38" creationId="{00000000-0000-0000-0000-000000000000}"/>
+          </ac:spMkLst>
+        </pc:spChg>
+        <pc:spChg chg="del">
+          <ac:chgData name="Shannon Wong" userId="8c83f3d3550a5322" providerId="LiveId" clId="{A706477B-DE66-4372-985B-D78DB1612323}" dt="2020-04-02T12:35:50.913" v="38" actId="478"/>
+          <ac:spMkLst>
+            <pc:docMk/>
+            <pc:sldMk cId="3228498101" sldId="269"/>
+            <ac:spMk id="40" creationId="{00000000-0000-0000-0000-000000000000}"/>
+          </ac:spMkLst>
+        </pc:spChg>
+        <pc:spChg chg="del">
+          <ac:chgData name="Shannon Wong" userId="8c83f3d3550a5322" providerId="LiveId" clId="{A706477B-DE66-4372-985B-D78DB1612323}" dt="2020-04-02T12:35:39.003" v="35" actId="478"/>
+          <ac:spMkLst>
+            <pc:docMk/>
+            <pc:sldMk cId="3228498101" sldId="269"/>
+            <ac:spMk id="44" creationId="{1ABAE2EE-0C6F-40C9-9F83-C6E45146189B}"/>
+          </ac:spMkLst>
+        </pc:spChg>
+        <pc:spChg chg="mod">
+          <ac:chgData name="Shannon Wong" userId="8c83f3d3550a5322" providerId="LiveId" clId="{A706477B-DE66-4372-985B-D78DB1612323}" dt="2020-04-02T13:22:40.346" v="136" actId="14100"/>
+          <ac:spMkLst>
+            <pc:docMk/>
+            <pc:sldMk cId="3228498101" sldId="269"/>
+            <ac:spMk id="45" creationId="{0EB24DA8-2498-4853-AED4-3458A81C456A}"/>
+          </ac:spMkLst>
+        </pc:spChg>
+        <pc:spChg chg="mod">
+          <ac:chgData name="Shannon Wong" userId="8c83f3d3550a5322" providerId="LiveId" clId="{A706477B-DE66-4372-985B-D78DB1612323}" dt="2020-04-02T13:22:40.346" v="136" actId="14100"/>
+          <ac:spMkLst>
+            <pc:docMk/>
+            <pc:sldMk cId="3228498101" sldId="269"/>
+            <ac:spMk id="46" creationId="{9BC66A45-C94A-4E62-8981-39EC5DACDD6D}"/>
+          </ac:spMkLst>
+        </pc:spChg>
+        <pc:spChg chg="mod">
+          <ac:chgData name="Shannon Wong" userId="8c83f3d3550a5322" providerId="LiveId" clId="{A706477B-DE66-4372-985B-D78DB1612323}" dt="2020-04-02T12:36:31.081" v="48" actId="1076"/>
+          <ac:spMkLst>
+            <pc:docMk/>
+            <pc:sldMk cId="3228498101" sldId="269"/>
+            <ac:spMk id="47" creationId="{342B431E-151F-4A55-A1AE-57F6FE56D1EF}"/>
+          </ac:spMkLst>
+        </pc:spChg>
+        <pc:spChg chg="mod">
+          <ac:chgData name="Shannon Wong" userId="8c83f3d3550a5322" providerId="LiveId" clId="{A706477B-DE66-4372-985B-D78DB1612323}" dt="2020-04-02T13:22:40.346" v="136" actId="14100"/>
+          <ac:spMkLst>
+            <pc:docMk/>
+            <pc:sldMk cId="3228498101" sldId="269"/>
+            <ac:spMk id="48" creationId="{5278BFBC-6FA4-432C-994E-8DD2A55ED046}"/>
+          </ac:spMkLst>
+        </pc:spChg>
+        <pc:spChg chg="mod">
+          <ac:chgData name="Shannon Wong" userId="8c83f3d3550a5322" providerId="LiveId" clId="{A706477B-DE66-4372-985B-D78DB1612323}" dt="2020-04-02T13:23:30.658" v="139" actId="14100"/>
+          <ac:spMkLst>
+            <pc:docMk/>
+            <pc:sldMk cId="3228498101" sldId="269"/>
+            <ac:spMk id="52" creationId="{C30F3633-BE5D-441D-9C87-D00C0DFC3E6D}"/>
+          </ac:spMkLst>
+        </pc:spChg>
+        <pc:spChg chg="del">
+          <ac:chgData name="Shannon Wong" userId="8c83f3d3550a5322" providerId="LiveId" clId="{A706477B-DE66-4372-985B-D78DB1612323}" dt="2020-04-02T12:36:42.098" v="51" actId="478"/>
+          <ac:spMkLst>
+            <pc:docMk/>
+            <pc:sldMk cId="3228498101" sldId="269"/>
+            <ac:spMk id="53" creationId="{E7397DF1-A503-43B8-9D46-710440F45D61}"/>
+          </ac:spMkLst>
+        </pc:spChg>
+        <pc:cxnChg chg="add del mod">
+          <ac:chgData name="Shannon Wong" userId="8c83f3d3550a5322" providerId="LiveId" clId="{A706477B-DE66-4372-985B-D78DB1612323}" dt="2020-04-02T13:22:28.293" v="135" actId="478"/>
+          <ac:cxnSpMkLst>
+            <pc:docMk/>
+            <pc:sldMk cId="3228498101" sldId="269"/>
+            <ac:cxnSpMk id="3" creationId="{BA5C8E38-63BE-402F-866F-1504B4A9A7C0}"/>
+          </ac:cxnSpMkLst>
+        </pc:cxnChg>
+        <pc:cxnChg chg="mod">
+          <ac:chgData name="Shannon Wong" userId="8c83f3d3550a5322" providerId="LiveId" clId="{A706477B-DE66-4372-985B-D78DB1612323}" dt="2020-04-02T13:03:40.835" v="118" actId="1038"/>
+          <ac:cxnSpMkLst>
+            <pc:docMk/>
+            <pc:sldMk cId="3228498101" sldId="269"/>
+            <ac:cxnSpMk id="54" creationId="{BB6AEF2A-70C0-4C86-ACC0-ED4823D6AC46}"/>
+          </ac:cxnSpMkLst>
+        </pc:cxnChg>
+        <pc:cxnChg chg="mod">
+          <ac:chgData name="Shannon Wong" userId="8c83f3d3550a5322" providerId="LiveId" clId="{A706477B-DE66-4372-985B-D78DB1612323}" dt="2020-04-02T13:03:40.835" v="118" actId="1038"/>
+          <ac:cxnSpMkLst>
+            <pc:docMk/>
+            <pc:sldMk cId="3228498101" sldId="269"/>
+            <ac:cxnSpMk id="55" creationId="{9664B067-90B9-447F-947E-62F78A316229}"/>
+          </ac:cxnSpMkLst>
+        </pc:cxnChg>
+      </pc:sldChg>
+      <pc:sldChg chg="addSp delSp modSp del delAnim modAnim">
+        <pc:chgData name="Shannon Wong" userId="8c83f3d3550a5322" providerId="LiveId" clId="{A706477B-DE66-4372-985B-D78DB1612323}" dt="2020-04-02T13:03:22.031" v="115" actId="2696"/>
+        <pc:sldMkLst>
+          <pc:docMk/>
+          <pc:sldMk cId="1666434637" sldId="270"/>
+        </pc:sldMkLst>
+        <pc:spChg chg="add del mod">
+          <ac:chgData name="Shannon Wong" userId="8c83f3d3550a5322" providerId="LiveId" clId="{A706477B-DE66-4372-985B-D78DB1612323}" dt="2020-04-02T12:56:12.399" v="79" actId="478"/>
+          <ac:spMkLst>
+            <pc:docMk/>
+            <pc:sldMk cId="1666434637" sldId="270"/>
+            <ac:spMk id="30" creationId="{25D28F5C-F657-4A1E-B293-EE347617B0A9}"/>
+          </ac:spMkLst>
+        </pc:spChg>
+      </pc:sldChg>
+      <pc:sldChg chg="addSp delSp modSp add delAnim modAnim">
+        <pc:chgData name="Shannon Wong" userId="8c83f3d3550a5322" providerId="LiveId" clId="{A706477B-DE66-4372-985B-D78DB1612323}" dt="2020-04-02T13:25:32.308" v="151" actId="14100"/>
+        <pc:sldMkLst>
+          <pc:docMk/>
+          <pc:sldMk cId="3751930298" sldId="271"/>
+        </pc:sldMkLst>
+        <pc:spChg chg="mod">
+          <ac:chgData name="Shannon Wong" userId="8c83f3d3550a5322" providerId="LiveId" clId="{A706477B-DE66-4372-985B-D78DB1612323}" dt="2020-04-02T13:24:15.807" v="142" actId="14100"/>
+          <ac:spMkLst>
+            <pc:docMk/>
+            <pc:sldMk cId="3751930298" sldId="271"/>
+            <ac:spMk id="5" creationId="{00000000-0000-0000-0000-000000000000}"/>
+          </ac:spMkLst>
+        </pc:spChg>
+        <pc:spChg chg="del">
+          <ac:chgData name="Shannon Wong" userId="8c83f3d3550a5322" providerId="LiveId" clId="{A706477B-DE66-4372-985B-D78DB1612323}" dt="2020-04-02T12:57:06.665" v="87" actId="478"/>
+          <ac:spMkLst>
+            <pc:docMk/>
+            <pc:sldMk cId="3751930298" sldId="271"/>
+            <ac:spMk id="18" creationId="{00000000-0000-0000-0000-000000000000}"/>
+          </ac:spMkLst>
+        </pc:spChg>
+        <pc:spChg chg="mod">
+          <ac:chgData name="Shannon Wong" userId="8c83f3d3550a5322" providerId="LiveId" clId="{A706477B-DE66-4372-985B-D78DB1612323}" dt="2020-04-02T13:25:32.308" v="151" actId="14100"/>
+          <ac:spMkLst>
+            <pc:docMk/>
+            <pc:sldMk cId="3751930298" sldId="271"/>
+            <ac:spMk id="19" creationId="{00000000-0000-0000-0000-000000000000}"/>
+          </ac:spMkLst>
+        </pc:spChg>
+        <pc:spChg chg="mod">
+          <ac:chgData name="Shannon Wong" userId="8c83f3d3550a5322" providerId="LiveId" clId="{A706477B-DE66-4372-985B-D78DB1612323}" dt="2020-04-02T13:24:35.793" v="143" actId="14100"/>
+          <ac:spMkLst>
+            <pc:docMk/>
+            <pc:sldMk cId="3751930298" sldId="271"/>
+            <ac:spMk id="20" creationId="{00000000-0000-0000-0000-000000000000}"/>
+          </ac:spMkLst>
+        </pc:spChg>
+        <pc:spChg chg="del">
+          <ac:chgData name="Shannon Wong" userId="8c83f3d3550a5322" providerId="LiveId" clId="{A706477B-DE66-4372-985B-D78DB1612323}" dt="2020-04-02T12:57:53.019" v="97" actId="478"/>
+          <ac:spMkLst>
+            <pc:docMk/>
+            <pc:sldMk cId="3751930298" sldId="271"/>
+            <ac:spMk id="21" creationId="{00000000-0000-0000-0000-000000000000}"/>
+          </ac:spMkLst>
+        </pc:spChg>
+        <pc:spChg chg="mod">
+          <ac:chgData name="Shannon Wong" userId="8c83f3d3550a5322" providerId="LiveId" clId="{A706477B-DE66-4372-985B-D78DB1612323}" dt="2020-04-02T13:25:02.903" v="146" actId="14100"/>
+          <ac:spMkLst>
+            <pc:docMk/>
+            <pc:sldMk cId="3751930298" sldId="271"/>
+            <ac:spMk id="24" creationId="{00000000-0000-0000-0000-000000000000}"/>
+          </ac:spMkLst>
+        </pc:spChg>
+        <pc:spChg chg="mod">
+          <ac:chgData name="Shannon Wong" userId="8c83f3d3550a5322" providerId="LiveId" clId="{A706477B-DE66-4372-985B-D78DB1612323}" dt="2020-04-02T12:59:34.284" v="114" actId="1037"/>
+          <ac:spMkLst>
+            <pc:docMk/>
+            <pc:sldMk cId="3751930298" sldId="271"/>
+            <ac:spMk id="25" creationId="{00000000-0000-0000-0000-000000000000}"/>
+          </ac:spMkLst>
+        </pc:spChg>
+        <pc:spChg chg="add">
+          <ac:chgData name="Shannon Wong" userId="8c83f3d3550a5322" providerId="LiveId" clId="{A706477B-DE66-4372-985B-D78DB1612323}" dt="2020-04-02T12:56:23.117" v="81"/>
+          <ac:spMkLst>
+            <pc:docMk/>
+            <pc:sldMk cId="3751930298" sldId="271"/>
+            <ac:spMk id="28" creationId="{C55D073A-D904-44D4-A449-45BCF5FC7DD2}"/>
+          </ac:spMkLst>
+        </pc:spChg>
+        <pc:spChg chg="del">
+          <ac:chgData name="Shannon Wong" userId="8c83f3d3550a5322" providerId="LiveId" clId="{A706477B-DE66-4372-985B-D78DB1612323}" dt="2020-04-02T12:56:21.575" v="80" actId="478"/>
+          <ac:spMkLst>
+            <pc:docMk/>
+            <pc:sldMk cId="3751930298" sldId="271"/>
+            <ac:spMk id="29" creationId="{00000000-0000-0000-0000-000000000000}"/>
+          </ac:spMkLst>
+        </pc:spChg>
+        <pc:spChg chg="mod">
+          <ac:chgData name="Shannon Wong" userId="8c83f3d3550a5322" providerId="LiveId" clId="{A706477B-DE66-4372-985B-D78DB1612323}" dt="2020-04-02T12:59:04.140" v="111" actId="14100"/>
+          <ac:spMkLst>
+            <pc:docMk/>
+            <pc:sldMk cId="3751930298" sldId="271"/>
+            <ac:spMk id="30" creationId="{E61F55CE-8BAB-4C52-8D9F-72914F7709D0}"/>
+          </ac:spMkLst>
+        </pc:spChg>
+        <pc:spChg chg="mod">
+          <ac:chgData name="Shannon Wong" userId="8c83f3d3550a5322" providerId="LiveId" clId="{A706477B-DE66-4372-985B-D78DB1612323}" dt="2020-04-02T13:25:11.087" v="148" actId="14100"/>
+          <ac:spMkLst>
+            <pc:docMk/>
+            <pc:sldMk cId="3751930298" sldId="271"/>
+            <ac:spMk id="31" creationId="{A46E2A60-C793-4B50-A5C3-6230067649BA}"/>
+          </ac:spMkLst>
+        </pc:spChg>
+        <pc:spChg chg="add mod">
+          <ac:chgData name="Shannon Wong" userId="8c83f3d3550a5322" providerId="LiveId" clId="{A706477B-DE66-4372-985B-D78DB1612323}" dt="2020-04-02T12:58:40.637" v="105" actId="1076"/>
+          <ac:spMkLst>
+            <pc:docMk/>
+            <pc:sldMk cId="3751930298" sldId="271"/>
+            <ac:spMk id="32" creationId="{BB4C268C-B14E-47E4-88B4-F475ED65F1DC}"/>
+          </ac:spMkLst>
+        </pc:spChg>
+        <pc:spChg chg="mod">
+          <ac:chgData name="Shannon Wong" userId="8c83f3d3550a5322" providerId="LiveId" clId="{A706477B-DE66-4372-985B-D78DB1612323}" dt="2020-04-02T13:25:27.226" v="150" actId="14100"/>
+          <ac:spMkLst>
+            <pc:docMk/>
+            <pc:sldMk cId="3751930298" sldId="271"/>
+            <ac:spMk id="33" creationId="{00000000-0000-0000-0000-000000000000}"/>
+          </ac:spMkLst>
+        </pc:spChg>
+        <pc:spChg chg="mod">
+          <ac:chgData name="Shannon Wong" userId="8c83f3d3550a5322" providerId="LiveId" clId="{A706477B-DE66-4372-985B-D78DB1612323}" dt="2020-04-02T13:24:40.207" v="144" actId="14100"/>
+          <ac:spMkLst>
+            <pc:docMk/>
+            <pc:sldMk cId="3751930298" sldId="271"/>
+            <ac:spMk id="34" creationId="{00000000-0000-0000-0000-000000000000}"/>
+          </ac:spMkLst>
+        </pc:spChg>
+        <pc:spChg chg="add mod">
+          <ac:chgData name="Shannon Wong" userId="8c83f3d3550a5322" providerId="LiveId" clId="{A706477B-DE66-4372-985B-D78DB1612323}" dt="2020-04-02T12:58:17.330" v="100" actId="1038"/>
+          <ac:spMkLst>
+            <pc:docMk/>
+            <pc:sldMk cId="3751930298" sldId="271"/>
+            <ac:spMk id="35" creationId="{31692552-B9C6-41E0-AE60-EB308C1C3253}"/>
+          </ac:spMkLst>
+        </pc:spChg>
+        <pc:spChg chg="add del">
+          <ac:chgData name="Shannon Wong" userId="8c83f3d3550a5322" providerId="LiveId" clId="{A706477B-DE66-4372-985B-D78DB1612323}" dt="2020-04-02T12:57:51.596" v="96"/>
+          <ac:spMkLst>
+            <pc:docMk/>
+            <pc:sldMk cId="3751930298" sldId="271"/>
+            <ac:spMk id="36" creationId="{0FA9CD42-E609-451F-A347-2B860836CC2C}"/>
+          </ac:spMkLst>
+        </pc:spChg>
+        <pc:spChg chg="add mod">
+          <ac:chgData name="Shannon Wong" userId="8c83f3d3550a5322" providerId="LiveId" clId="{A706477B-DE66-4372-985B-D78DB1612323}" dt="2020-04-02T12:57:57.740" v="99" actId="1076"/>
+          <ac:spMkLst>
+            <pc:docMk/>
+            <pc:sldMk cId="3751930298" sldId="271"/>
+            <ac:spMk id="37" creationId="{AE2A7241-B2FC-480D-B531-CE6F4EAEA5DD}"/>
+          </ac:spMkLst>
+        </pc:spChg>
+        <pc:spChg chg="mod">
+          <ac:chgData name="Shannon Wong" userId="8c83f3d3550a5322" providerId="LiveId" clId="{A706477B-DE66-4372-985B-D78DB1612323}" dt="2020-04-02T13:25:07.130" v="147" actId="14100"/>
+          <ac:spMkLst>
+            <pc:docMk/>
+            <pc:sldMk cId="3751930298" sldId="271"/>
+            <ac:spMk id="45" creationId="{0EB24DA8-2498-4853-AED4-3458A81C456A}"/>
+          </ac:spMkLst>
+        </pc:spChg>
+        <pc:spChg chg="mod">
+          <ac:chgData name="Shannon Wong" userId="8c83f3d3550a5322" providerId="LiveId" clId="{A706477B-DE66-4372-985B-D78DB1612323}" dt="2020-04-02T12:59:18.273" v="112" actId="14100"/>
+          <ac:spMkLst>
+            <pc:docMk/>
+            <pc:sldMk cId="3751930298" sldId="271"/>
+            <ac:spMk id="46" creationId="{9BC66A45-C94A-4E62-8981-39EC5DACDD6D}"/>
+          </ac:spMkLst>
+        </pc:spChg>
+        <pc:spChg chg="del">
+          <ac:chgData name="Shannon Wong" userId="8c83f3d3550a5322" providerId="LiveId" clId="{A706477B-DE66-4372-985B-D78DB1612323}" dt="2020-04-02T12:56:49.237" v="82" actId="478"/>
+          <ac:spMkLst>
+            <pc:docMk/>
+            <pc:sldMk cId="3751930298" sldId="271"/>
+            <ac:spMk id="47" creationId="{342B431E-151F-4A55-A1AE-57F6FE56D1EF}"/>
+          </ac:spMkLst>
+        </pc:spChg>
+        <pc:spChg chg="mod">
+          <ac:chgData name="Shannon Wong" userId="8c83f3d3550a5322" providerId="LiveId" clId="{A706477B-DE66-4372-985B-D78DB1612323}" dt="2020-04-02T13:24:48.911" v="145" actId="14100"/>
+          <ac:spMkLst>
+            <pc:docMk/>
+            <pc:sldMk cId="3751930298" sldId="271"/>
+            <ac:spMk id="48" creationId="{5278BFBC-6FA4-432C-994E-8DD2A55ED046}"/>
+          </ac:spMkLst>
+        </pc:spChg>
+        <pc:spChg chg="mod">
+          <ac:chgData name="Shannon Wong" userId="8c83f3d3550a5322" providerId="LiveId" clId="{A706477B-DE66-4372-985B-D78DB1612323}" dt="2020-04-02T13:25:22.766" v="149" actId="14100"/>
+          <ac:spMkLst>
+            <pc:docMk/>
+            <pc:sldMk cId="3751930298" sldId="271"/>
+            <ac:spMk id="52" creationId="{C30F3633-BE5D-441D-9C87-D00C0DFC3E6D}"/>
+          </ac:spMkLst>
+        </pc:spChg>
+        <pc:cxnChg chg="mod">
+          <ac:chgData name="Shannon Wong" userId="8c83f3d3550a5322" providerId="LiveId" clId="{A706477B-DE66-4372-985B-D78DB1612323}" dt="2020-04-02T12:58:51.134" v="109" actId="1035"/>
+          <ac:cxnSpMkLst>
+            <pc:docMk/>
+            <pc:sldMk cId="3751930298" sldId="271"/>
+            <ac:cxnSpMk id="54" creationId="{BB6AEF2A-70C0-4C86-ACC0-ED4823D6AC46}"/>
+          </ac:cxnSpMkLst>
+        </pc:cxnChg>
+        <pc:cxnChg chg="mod">
+          <ac:chgData name="Shannon Wong" userId="8c83f3d3550a5322" providerId="LiveId" clId="{A706477B-DE66-4372-985B-D78DB1612323}" dt="2020-04-02T12:58:51.134" v="109" actId="1035"/>
+          <ac:cxnSpMkLst>
+            <pc:docMk/>
+            <pc:sldMk cId="3751930298" sldId="271"/>
+            <ac:cxnSpMk id="55" creationId="{9664B067-90B9-447F-947E-62F78A316229}"/>
+          </ac:cxnSpMkLst>
+        </pc:cxnChg>
+      </pc:sldChg>
+    </pc:docChg>
+  </pc:docChgLst>
 </pc:chgInfo>
 </file>
 
@@ -588,7 +994,7 @@
           <a:p>
             <a:fld id="{9629A0FB-7277-41B0-BEC2-EE35F8B0CE39}" type="datetimeFigureOut">
               <a:rPr lang="en-SG" smtClean="0"/>
-              <a:t>23/3/2020</a:t>
+              <a:t>2/4/2020</a:t>
             </a:fld>
             <a:endParaRPr lang="en-SG"/>
           </a:p>
@@ -1046,7 +1452,7 @@
     </p:spTree>
     <p:extLst>
       <p:ext uri="{BB962C8B-B14F-4D97-AF65-F5344CB8AC3E}">
-        <p14:creationId xmlns:p14="http://schemas.microsoft.com/office/powerpoint/2010/main" val="949336926"/>
+        <p14:creationId xmlns:p14="http://schemas.microsoft.com/office/powerpoint/2010/main" val="722716218"/>
       </p:ext>
     </p:extLst>
   </p:cSld>
@@ -4310,8 +4716,8 @@
         </p:nvSpPr>
         <p:spPr bwMode="auto">
           <a:xfrm>
-            <a:off x="728768" y="1440950"/>
-            <a:ext cx="10115" cy="3904336"/>
+            <a:off x="728768" y="1440949"/>
+            <a:ext cx="0" cy="4408867"/>
           </a:xfrm>
           <a:prstGeom prst="line">
             <a:avLst/>
@@ -4427,62 +4833,6 @@
       </p:sp>
       <p:sp>
         <p:nvSpPr>
-          <p:cNvPr id="17" name="Rectangle 16"/>
-          <p:cNvSpPr/>
-          <p:nvPr/>
-        </p:nvSpPr>
-        <p:spPr>
-          <a:xfrm>
-            <a:off x="603890" y="1721228"/>
-            <a:ext cx="225619" cy="3348432"/>
-          </a:xfrm>
-          <a:prstGeom prst="rect">
-            <a:avLst/>
-          </a:prstGeom>
-          <a:solidFill>
-            <a:schemeClr val="accent2">
-              <a:lumMod val="40000"/>
-              <a:lumOff val="60000"/>
-            </a:schemeClr>
-          </a:solidFill>
-          <a:ln>
-            <a:solidFill>
-              <a:schemeClr val="accent2">
-                <a:lumMod val="60000"/>
-                <a:lumOff val="40000"/>
-              </a:schemeClr>
-            </a:solidFill>
-          </a:ln>
-        </p:spPr>
-        <p:style>
-          <a:lnRef idx="2">
-            <a:schemeClr val="accent4"/>
-          </a:lnRef>
-          <a:fillRef idx="1">
-            <a:schemeClr val="lt1"/>
-          </a:fillRef>
-          <a:effectRef idx="0">
-            <a:schemeClr val="accent4"/>
-          </a:effectRef>
-          <a:fontRef idx="minor">
-            <a:schemeClr val="dk1"/>
-          </a:fontRef>
-        </p:style>
-        <p:txBody>
-          <a:bodyPr rtlCol="0" anchor="ctr"/>
-          <a:lstStyle/>
-          <a:p>
-            <a:pPr algn="ctr" defTabSz="872733"/>
-            <a:endParaRPr lang="en-US" sz="1500">
-              <a:solidFill>
-                <a:prstClr val="black"/>
-              </a:solidFill>
-            </a:endParaRPr>
-          </a:p>
-        </p:txBody>
-      </p:sp>
-      <p:sp>
-        <p:nvSpPr>
           <p:cNvPr id="18" name="Text Box 11"/>
           <p:cNvSpPr txBox="1">
             <a:spLocks noChangeArrowheads="1"/>
@@ -4564,7 +4914,7 @@
         <p:spPr bwMode="auto">
           <a:xfrm flipH="1">
             <a:off x="3018095" y="2137789"/>
-            <a:ext cx="8589" cy="1590924"/>
+            <a:ext cx="0" cy="1590924"/>
           </a:xfrm>
           <a:prstGeom prst="line">
             <a:avLst/>
@@ -4617,8 +4967,8 @@
         </p:nvSpPr>
         <p:spPr bwMode="auto">
           <a:xfrm flipV="1">
-            <a:off x="823868" y="1898263"/>
-            <a:ext cx="1747815" cy="12191"/>
+            <a:off x="738884" y="1898262"/>
+            <a:ext cx="1832800" cy="0"/>
           </a:xfrm>
           <a:prstGeom prst="line">
             <a:avLst/>
@@ -4656,7 +5006,7 @@
         </p:nvSpPr>
         <p:spPr bwMode="auto">
           <a:xfrm>
-            <a:off x="5984359" y="4044402"/>
+            <a:off x="6090146" y="4022515"/>
             <a:ext cx="1904637" cy="323165"/>
           </a:xfrm>
           <a:prstGeom prst="rect">
@@ -4704,8 +5054,8 @@
         </p:nvSpPr>
         <p:spPr bwMode="auto">
           <a:xfrm flipV="1">
-            <a:off x="3194466" y="3121220"/>
-            <a:ext cx="1871184" cy="18880"/>
+            <a:off x="3026684" y="3121220"/>
+            <a:ext cx="2038966" cy="0"/>
           </a:xfrm>
           <a:prstGeom prst="line">
             <a:avLst/>
@@ -4849,9 +5199,9 @@
           <p:nvPr/>
         </p:nvSpPr>
         <p:spPr bwMode="auto">
-          <a:xfrm flipH="1">
-            <a:off x="5843365" y="3396473"/>
-            <a:ext cx="4560" cy="1893221"/>
+          <a:xfrm>
+            <a:off x="5868793" y="3412703"/>
+            <a:ext cx="0" cy="2210483"/>
           </a:xfrm>
           <a:prstGeom prst="line">
             <a:avLst/>
@@ -4904,8 +5254,8 @@
         </p:nvSpPr>
         <p:spPr bwMode="auto">
           <a:xfrm flipV="1">
-            <a:off x="863760" y="2696243"/>
-            <a:ext cx="2040971" cy="1"/>
+            <a:off x="738882" y="2683404"/>
+            <a:ext cx="2287802" cy="0"/>
           </a:xfrm>
           <a:prstGeom prst="line">
             <a:avLst/>
@@ -4944,7 +5294,7 @@
         <p:spPr bwMode="auto">
           <a:xfrm>
             <a:off x="1211846" y="1581835"/>
-            <a:ext cx="1182981" cy="323165"/>
+            <a:ext cx="1182981" cy="0"/>
           </a:xfrm>
           <a:prstGeom prst="rect">
             <a:avLst/>
@@ -4974,61 +5324,6 @@
               <a:rPr lang="en-US" sz="1500" i="1" dirty="0"/>
               <a:t>Parser()</a:t>
             </a:r>
-          </a:p>
-        </p:txBody>
-      </p:sp>
-      <p:sp>
-        <p:nvSpPr>
-          <p:cNvPr id="40" name="Rectangle 39"/>
-          <p:cNvSpPr/>
-          <p:nvPr/>
-        </p:nvSpPr>
-        <p:spPr>
-          <a:xfrm>
-            <a:off x="5717684" y="4066313"/>
-            <a:ext cx="251361" cy="878804"/>
-          </a:xfrm>
-          <a:prstGeom prst="rect">
-            <a:avLst/>
-          </a:prstGeom>
-          <a:solidFill>
-            <a:schemeClr val="accent3">
-              <a:lumMod val="20000"/>
-              <a:lumOff val="80000"/>
-            </a:schemeClr>
-          </a:solidFill>
-          <a:ln>
-            <a:solidFill>
-              <a:schemeClr val="accent3">
-                <a:lumMod val="75000"/>
-              </a:schemeClr>
-            </a:solidFill>
-          </a:ln>
-        </p:spPr>
-        <p:style>
-          <a:lnRef idx="2">
-            <a:schemeClr val="accent4"/>
-          </a:lnRef>
-          <a:fillRef idx="1">
-            <a:schemeClr val="lt1"/>
-          </a:fillRef>
-          <a:effectRef idx="0">
-            <a:schemeClr val="accent4"/>
-          </a:effectRef>
-          <a:fontRef idx="minor">
-            <a:schemeClr val="dk1"/>
-          </a:fontRef>
-        </p:style>
-        <p:txBody>
-          <a:bodyPr rtlCol="0" anchor="ctr"/>
-          <a:lstStyle/>
-          <a:p>
-            <a:pPr algn="ctr" defTabSz="872733"/>
-            <a:endParaRPr lang="en-US" sz="1500">
-              <a:solidFill>
-                <a:prstClr val="black"/>
-              </a:solidFill>
-            </a:endParaRPr>
           </a:p>
         </p:txBody>
       </p:sp>
@@ -5191,67 +5486,6 @@
       </p:sp>
       <p:sp>
         <p:nvSpPr>
-          <p:cNvPr id="44" name="Rectangle 43">
-            <a:extLst>
-              <a:ext uri="{FF2B5EF4-FFF2-40B4-BE49-F238E27FC236}">
-                <a16:creationId xmlns:a16="http://schemas.microsoft.com/office/drawing/2014/main" id="{1ABAE2EE-0C6F-40C9-9F83-C6E45146189B}"/>
-              </a:ext>
-            </a:extLst>
-          </p:cNvPr>
-          <p:cNvSpPr/>
-          <p:nvPr/>
-        </p:nvSpPr>
-        <p:spPr>
-          <a:xfrm>
-            <a:off x="2888219" y="2698465"/>
-            <a:ext cx="286905" cy="893938"/>
-          </a:xfrm>
-          <a:prstGeom prst="rect">
-            <a:avLst/>
-          </a:prstGeom>
-          <a:solidFill>
-            <a:schemeClr val="accent4">
-              <a:lumMod val="40000"/>
-              <a:lumOff val="60000"/>
-            </a:schemeClr>
-          </a:solidFill>
-          <a:ln>
-            <a:solidFill>
-              <a:schemeClr val="accent4">
-                <a:lumMod val="75000"/>
-              </a:schemeClr>
-            </a:solidFill>
-          </a:ln>
-        </p:spPr>
-        <p:style>
-          <a:lnRef idx="2">
-            <a:schemeClr val="accent4"/>
-          </a:lnRef>
-          <a:fillRef idx="1">
-            <a:schemeClr val="lt1"/>
-          </a:fillRef>
-          <a:effectRef idx="0">
-            <a:schemeClr val="accent4"/>
-          </a:effectRef>
-          <a:fontRef idx="minor">
-            <a:schemeClr val="dk1"/>
-          </a:fontRef>
-        </p:style>
-        <p:txBody>
-          <a:bodyPr rtlCol="0" anchor="ctr"/>
-          <a:lstStyle/>
-          <a:p>
-            <a:pPr algn="ctr" defTabSz="872733"/>
-            <a:endParaRPr lang="en-US" sz="1500">
-              <a:solidFill>
-                <a:prstClr val="black"/>
-              </a:solidFill>
-            </a:endParaRPr>
-          </a:p>
-        </p:txBody>
-      </p:sp>
-      <p:sp>
-        <p:nvSpPr>
           <p:cNvPr id="45" name="Line 15">
             <a:extLst>
               <a:ext uri="{FF2B5EF4-FFF2-40B4-BE49-F238E27FC236}">
@@ -5266,8 +5500,8 @@
         </p:nvSpPr>
         <p:spPr bwMode="auto">
           <a:xfrm>
-            <a:off x="875317" y="4066311"/>
-            <a:ext cx="4877422" cy="12839"/>
+            <a:off x="738882" y="4056965"/>
+            <a:ext cx="5119797" cy="0"/>
           </a:xfrm>
           <a:prstGeom prst="line">
             <a:avLst/>
@@ -5312,9 +5546,9 @@
           <p:nvPr/>
         </p:nvSpPr>
         <p:spPr bwMode="auto">
-          <a:xfrm>
-            <a:off x="5969045" y="4367567"/>
-            <a:ext cx="1970403" cy="11401"/>
+          <a:xfrm flipV="1">
+            <a:off x="5858679" y="4350048"/>
+            <a:ext cx="2211992" cy="0"/>
           </a:xfrm>
           <a:prstGeom prst="line">
             <a:avLst/>
@@ -5360,7 +5594,7 @@
         </p:nvSpPr>
         <p:spPr bwMode="auto">
           <a:xfrm>
-            <a:off x="3174259" y="2826789"/>
+            <a:off x="3096902" y="2798232"/>
             <a:ext cx="2084117" cy="323165"/>
           </a:xfrm>
           <a:prstGeom prst="rect">
@@ -5414,8 +5648,8 @@
         </p:nvSpPr>
         <p:spPr bwMode="auto">
           <a:xfrm flipH="1">
-            <a:off x="852246" y="3573169"/>
-            <a:ext cx="2016629" cy="7945"/>
+            <a:off x="747472" y="3559767"/>
+            <a:ext cx="2267695" cy="0"/>
           </a:xfrm>
           <a:prstGeom prst="line">
             <a:avLst/>
@@ -5595,9 +5829,9 @@
           <p:nvPr/>
         </p:nvSpPr>
         <p:spPr bwMode="auto">
-          <a:xfrm>
-            <a:off x="8070671" y="3740237"/>
-            <a:ext cx="0" cy="1605048"/>
+          <a:xfrm flipH="1">
+            <a:off x="8054895" y="3740236"/>
+            <a:ext cx="0" cy="2109580"/>
           </a:xfrm>
           <a:prstGeom prst="line">
             <a:avLst/>
@@ -5640,66 +5874,6 @@
           </a:p>
         </p:txBody>
       </p:sp>
-      <p:sp>
-        <p:nvSpPr>
-          <p:cNvPr id="53" name="Rectangle 52">
-            <a:extLst>
-              <a:ext uri="{FF2B5EF4-FFF2-40B4-BE49-F238E27FC236}">
-                <a16:creationId xmlns:a16="http://schemas.microsoft.com/office/drawing/2014/main" id="{E7397DF1-A503-43B8-9D46-710440F45D61}"/>
-              </a:ext>
-            </a:extLst>
-          </p:cNvPr>
-          <p:cNvSpPr/>
-          <p:nvPr/>
-        </p:nvSpPr>
-        <p:spPr>
-          <a:xfrm>
-            <a:off x="7944991" y="4367567"/>
-            <a:ext cx="251361" cy="697392"/>
-          </a:xfrm>
-          <a:prstGeom prst="rect">
-            <a:avLst/>
-          </a:prstGeom>
-          <a:solidFill>
-            <a:schemeClr val="bg2">
-              <a:lumMod val="75000"/>
-            </a:schemeClr>
-          </a:solidFill>
-          <a:ln>
-            <a:solidFill>
-              <a:schemeClr val="bg2">
-                <a:lumMod val="50000"/>
-              </a:schemeClr>
-            </a:solidFill>
-          </a:ln>
-        </p:spPr>
-        <p:style>
-          <a:lnRef idx="2">
-            <a:schemeClr val="accent4"/>
-          </a:lnRef>
-          <a:fillRef idx="1">
-            <a:schemeClr val="lt1"/>
-          </a:fillRef>
-          <a:effectRef idx="0">
-            <a:schemeClr val="accent4"/>
-          </a:effectRef>
-          <a:fontRef idx="minor">
-            <a:schemeClr val="dk1"/>
-          </a:fontRef>
-        </p:style>
-        <p:txBody>
-          <a:bodyPr rtlCol="0" anchor="ctr"/>
-          <a:lstStyle/>
-          <a:p>
-            <a:pPr algn="ctr" defTabSz="872733"/>
-            <a:endParaRPr lang="en-US" sz="1500">
-              <a:solidFill>
-                <a:prstClr val="black"/>
-              </a:solidFill>
-            </a:endParaRPr>
-          </a:p>
-        </p:txBody>
-      </p:sp>
       <p:cxnSp>
         <p:nvCxnSpPr>
           <p:cNvPr id="54" name="Straight Connector 53">
@@ -5714,7 +5888,7 @@
         </p:nvCxnSpPr>
         <p:spPr>
           <a:xfrm rot="16200000" flipV="1">
-            <a:off x="5698544" y="5196333"/>
+            <a:off x="5743757" y="5509615"/>
             <a:ext cx="284430" cy="267655"/>
           </a:xfrm>
           <a:prstGeom prst="line">
@@ -5757,7 +5931,7 @@
         </p:nvCxnSpPr>
         <p:spPr>
           <a:xfrm rot="5400000">
-            <a:off x="5691954" y="5200827"/>
+            <a:off x="5737167" y="5514109"/>
             <a:ext cx="288175" cy="266007"/>
           </a:xfrm>
           <a:prstGeom prst="line">
@@ -5786,6 +5960,102 @@
           </a:fontRef>
         </p:style>
       </p:cxnSp>
+      <p:sp>
+        <p:nvSpPr>
+          <p:cNvPr id="30" name="Line 15">
+            <a:extLst>
+              <a:ext uri="{FF2B5EF4-FFF2-40B4-BE49-F238E27FC236}">
+                <a16:creationId xmlns:a16="http://schemas.microsoft.com/office/drawing/2014/main" id="{E61F55CE-8BAB-4C52-8D9F-72914F7709D0}"/>
+              </a:ext>
+            </a:extLst>
+          </p:cNvPr>
+          <p:cNvSpPr>
+            <a:spLocks noChangeShapeType="1"/>
+          </p:cNvSpPr>
+          <p:nvPr/>
+        </p:nvSpPr>
+        <p:spPr bwMode="auto">
+          <a:xfrm flipH="1" flipV="1">
+            <a:off x="5858683" y="4876800"/>
+            <a:ext cx="2211988" cy="0"/>
+          </a:xfrm>
+          <a:prstGeom prst="line">
+            <a:avLst/>
+          </a:prstGeom>
+          <a:noFill/>
+          <a:ln w="19050">
+            <a:solidFill>
+              <a:schemeClr val="bg2">
+                <a:lumMod val="50000"/>
+              </a:schemeClr>
+            </a:solidFill>
+            <a:prstDash val="sysDash"/>
+            <a:round/>
+            <a:headEnd/>
+            <a:tailEnd type="triangle" w="lg" len="lg"/>
+          </a:ln>
+        </p:spPr>
+        <p:txBody>
+          <a:bodyPr/>
+          <a:lstStyle/>
+          <a:p>
+            <a:pPr defTabSz="872733"/>
+            <a:endParaRPr lang="en-US" sz="1500">
+              <a:solidFill>
+                <a:prstClr val="black"/>
+              </a:solidFill>
+            </a:endParaRPr>
+          </a:p>
+        </p:txBody>
+      </p:sp>
+      <p:sp>
+        <p:nvSpPr>
+          <p:cNvPr id="31" name="Line 15">
+            <a:extLst>
+              <a:ext uri="{FF2B5EF4-FFF2-40B4-BE49-F238E27FC236}">
+                <a16:creationId xmlns:a16="http://schemas.microsoft.com/office/drawing/2014/main" id="{A46E2A60-C793-4B50-A5C3-6230067649BA}"/>
+              </a:ext>
+            </a:extLst>
+          </p:cNvPr>
+          <p:cNvSpPr>
+            <a:spLocks noChangeShapeType="1"/>
+          </p:cNvSpPr>
+          <p:nvPr/>
+        </p:nvSpPr>
+        <p:spPr bwMode="auto">
+          <a:xfrm flipH="1">
+            <a:off x="738883" y="5222542"/>
+            <a:ext cx="5119796" cy="0"/>
+          </a:xfrm>
+          <a:prstGeom prst="line">
+            <a:avLst/>
+          </a:prstGeom>
+          <a:noFill/>
+          <a:ln w="19050">
+            <a:solidFill>
+              <a:schemeClr val="accent3">
+                <a:lumMod val="75000"/>
+              </a:schemeClr>
+            </a:solidFill>
+            <a:prstDash val="sysDash"/>
+            <a:round/>
+            <a:headEnd/>
+            <a:tailEnd type="triangle" w="lg" len="lg"/>
+          </a:ln>
+        </p:spPr>
+        <p:txBody>
+          <a:bodyPr/>
+          <a:lstStyle/>
+          <a:p>
+            <a:pPr defTabSz="872733"/>
+            <a:endParaRPr lang="en-US" sz="1500">
+              <a:solidFill>
+                <a:prstClr val="black"/>
+              </a:solidFill>
+            </a:endParaRPr>
+          </a:p>
+        </p:txBody>
+      </p:sp>
     </p:spTree>
     <p:extLst>
       <p:ext uri="{BB962C8B-B14F-4D97-AF65-F5344CB8AC3E}">
@@ -5965,7 +6235,7 @@
                                           </p:stCondLst>
                                         </p:cTn>
                                         <p:tgtEl>
-                                          <p:spTgt spid="17"/>
+                                          <p:spTgt spid="18"/>
                                         </p:tgtEl>
                                         <p:attrNameLst>
                                           <p:attrName>style.visibility</p:attrName>
@@ -5992,7 +6262,7 @@
                                           </p:stCondLst>
                                         </p:cTn>
                                         <p:tgtEl>
-                                          <p:spTgt spid="18"/>
+                                          <p:spTgt spid="19"/>
                                         </p:tgtEl>
                                         <p:attrNameLst>
                                           <p:attrName>style.visibility</p:attrName>
@@ -6019,7 +6289,7 @@
                                           </p:stCondLst>
                                         </p:cTn>
                                         <p:tgtEl>
-                                          <p:spTgt spid="19"/>
+                                          <p:spTgt spid="20"/>
                                         </p:tgtEl>
                                         <p:attrNameLst>
                                           <p:attrName>style.visibility</p:attrName>
@@ -6046,7 +6316,7 @@
                                           </p:stCondLst>
                                         </p:cTn>
                                         <p:tgtEl>
-                                          <p:spTgt spid="20"/>
+                                          <p:spTgt spid="21"/>
                                         </p:tgtEl>
                                         <p:attrNameLst>
                                           <p:attrName>style.visibility</p:attrName>
@@ -6060,7 +6330,7 @@
                                 </p:cTn>
                               </p:par>
                               <p:par>
-                                <p:cTn id="23" presetID="1" presetClass="exit" presetSubtype="0" fill="hold" grpId="0" nodeType="withEffect">
+                                <p:cTn id="23" presetID="1" presetClass="exit" presetSubtype="0" fill="hold" grpId="1" nodeType="withEffect">
                                   <p:stCondLst>
                                     <p:cond delay="0"/>
                                   </p:stCondLst>
@@ -6073,7 +6343,7 @@
                                           </p:stCondLst>
                                         </p:cTn>
                                         <p:tgtEl>
-                                          <p:spTgt spid="21"/>
+                                          <p:spTgt spid="24"/>
                                         </p:tgtEl>
                                         <p:attrNameLst>
                                           <p:attrName>style.visibility</p:attrName>
@@ -6100,7 +6370,7 @@
                                           </p:stCondLst>
                                         </p:cTn>
                                         <p:tgtEl>
-                                          <p:spTgt spid="24"/>
+                                          <p:spTgt spid="25"/>
                                         </p:tgtEl>
                                         <p:attrNameLst>
                                           <p:attrName>style.visibility</p:attrName>
@@ -6127,7 +6397,7 @@
                                           </p:stCondLst>
                                         </p:cTn>
                                         <p:tgtEl>
-                                          <p:spTgt spid="25"/>
+                                          <p:spTgt spid="29"/>
                                         </p:tgtEl>
                                         <p:attrNameLst>
                                           <p:attrName>style.visibility</p:attrName>
@@ -6141,7 +6411,7 @@
                                 </p:cTn>
                               </p:par>
                               <p:par>
-                                <p:cTn id="29" presetID="1" presetClass="exit" presetSubtype="0" fill="hold" grpId="1" nodeType="withEffect">
+                                <p:cTn id="29" presetID="1" presetClass="exit" presetSubtype="0" fill="hold" grpId="0" nodeType="withEffect">
                                   <p:stCondLst>
                                     <p:cond delay="0"/>
                                   </p:stCondLst>
@@ -6154,7 +6424,7 @@
                                           </p:stCondLst>
                                         </p:cTn>
                                         <p:tgtEl>
-                                          <p:spTgt spid="29"/>
+                                          <p:spTgt spid="33"/>
                                         </p:tgtEl>
                                         <p:attrNameLst>
                                           <p:attrName>style.visibility</p:attrName>
@@ -6181,7 +6451,7 @@
                                           </p:stCondLst>
                                         </p:cTn>
                                         <p:tgtEl>
-                                          <p:spTgt spid="33"/>
+                                          <p:spTgt spid="34"/>
                                         </p:tgtEl>
                                         <p:attrNameLst>
                                           <p:attrName>style.visibility</p:attrName>
@@ -6208,7 +6478,7 @@
                                           </p:stCondLst>
                                         </p:cTn>
                                         <p:tgtEl>
-                                          <p:spTgt spid="34"/>
+                                          <p:spTgt spid="38"/>
                                         </p:tgtEl>
                                         <p:attrNameLst>
                                           <p:attrName>style.visibility</p:attrName>
@@ -6235,7 +6505,7 @@
                                           </p:stCondLst>
                                         </p:cTn>
                                         <p:tgtEl>
-                                          <p:spTgt spid="38"/>
+                                          <p:spTgt spid="42"/>
                                         </p:tgtEl>
                                         <p:attrNameLst>
                                           <p:attrName>style.visibility</p:attrName>
@@ -6262,60 +6532,6 @@
                                           </p:stCondLst>
                                         </p:cTn>
                                         <p:tgtEl>
-                                          <p:spTgt spid="40"/>
-                                        </p:tgtEl>
-                                        <p:attrNameLst>
-                                          <p:attrName>style.visibility</p:attrName>
-                                        </p:attrNameLst>
-                                      </p:cBhvr>
-                                      <p:to>
-                                        <p:strVal val="hidden"/>
-                                      </p:to>
-                                    </p:set>
-                                  </p:childTnLst>
-                                </p:cTn>
-                              </p:par>
-                              <p:par>
-                                <p:cTn id="39" presetID="1" presetClass="exit" presetSubtype="0" fill="hold" grpId="0" nodeType="withEffect">
-                                  <p:stCondLst>
-                                    <p:cond delay="0"/>
-                                  </p:stCondLst>
-                                  <p:childTnLst>
-                                    <p:set>
-                                      <p:cBhvr>
-                                        <p:cTn id="40" dur="1" fill="hold">
-                                          <p:stCondLst>
-                                            <p:cond delay="0"/>
-                                          </p:stCondLst>
-                                        </p:cTn>
-                                        <p:tgtEl>
-                                          <p:spTgt spid="42"/>
-                                        </p:tgtEl>
-                                        <p:attrNameLst>
-                                          <p:attrName>style.visibility</p:attrName>
-                                        </p:attrNameLst>
-                                      </p:cBhvr>
-                                      <p:to>
-                                        <p:strVal val="hidden"/>
-                                      </p:to>
-                                    </p:set>
-                                  </p:childTnLst>
-                                </p:cTn>
-                              </p:par>
-                              <p:par>
-                                <p:cTn id="41" presetID="1" presetClass="exit" presetSubtype="0" fill="hold" grpId="0" nodeType="withEffect">
-                                  <p:stCondLst>
-                                    <p:cond delay="0"/>
-                                  </p:stCondLst>
-                                  <p:childTnLst>
-                                    <p:set>
-                                      <p:cBhvr>
-                                        <p:cTn id="42" dur="1" fill="hold">
-                                          <p:stCondLst>
-                                            <p:cond delay="0"/>
-                                          </p:stCondLst>
-                                        </p:cTn>
-                                        <p:tgtEl>
                                           <p:spTgt spid="43"/>
                                         </p:tgtEl>
                                         <p:attrNameLst>
@@ -6329,8 +6545,53 @@
                                   </p:childTnLst>
                                 </p:cTn>
                               </p:par>
+                            </p:childTnLst>
+                          </p:cTn>
+                        </p:par>
+                      </p:childTnLst>
+                    </p:cTn>
+                  </p:par>
+                  <p:par>
+                    <p:cTn id="39" fill="hold">
+                      <p:stCondLst>
+                        <p:cond delay="indefinite"/>
+                      </p:stCondLst>
+                      <p:childTnLst>
+                        <p:par>
+                          <p:cTn id="40" fill="hold">
+                            <p:stCondLst>
+                              <p:cond delay="0"/>
+                            </p:stCondLst>
+                            <p:childTnLst>
                               <p:par>
-                                <p:cTn id="43" presetID="1" presetClass="exit" presetSubtype="0" fill="hold" grpId="0" nodeType="withEffect">
+                                <p:cTn id="41" presetID="1" presetClass="entr" presetSubtype="0" fill="hold" grpId="0" nodeType="clickEffect">
+                                  <p:stCondLst>
+                                    <p:cond delay="0"/>
+                                  </p:stCondLst>
+                                  <p:childTnLst>
+                                    <p:set>
+                                      <p:cBhvr>
+                                        <p:cTn id="42" dur="1" fill="hold">
+                                          <p:stCondLst>
+                                            <p:cond delay="0"/>
+                                          </p:stCondLst>
+                                        </p:cTn>
+                                        <p:tgtEl>
+                                          <p:spTgt spid="45"/>
+                                        </p:tgtEl>
+                                        <p:attrNameLst>
+                                          <p:attrName>style.visibility</p:attrName>
+                                        </p:attrNameLst>
+                                      </p:cBhvr>
+                                      <p:to>
+                                        <p:strVal val="visible"/>
+                                      </p:to>
+                                    </p:set>
+                                  </p:childTnLst>
+                                </p:cTn>
+                              </p:par>
+                              <p:par>
+                                <p:cTn id="43" presetID="1" presetClass="exit" presetSubtype="0" fill="hold" grpId="1" nodeType="withEffect">
                                   <p:stCondLst>
                                     <p:cond delay="0"/>
                                   </p:stCondLst>
@@ -6343,7 +6604,7 @@
                                           </p:stCondLst>
                                         </p:cTn>
                                         <p:tgtEl>
-                                          <p:spTgt spid="44"/>
+                                          <p:spTgt spid="45"/>
                                         </p:tgtEl>
                                         <p:attrNameLst>
                                           <p:attrName>style.visibility</p:attrName>
@@ -6388,7 +6649,7 @@
                                           </p:stCondLst>
                                         </p:cTn>
                                         <p:tgtEl>
-                                          <p:spTgt spid="45"/>
+                                          <p:spTgt spid="46"/>
                                         </p:tgtEl>
                                         <p:attrNameLst>
                                           <p:attrName>style.visibility</p:attrName>
@@ -6415,7 +6676,7 @@
                                           </p:stCondLst>
                                         </p:cTn>
                                         <p:tgtEl>
-                                          <p:spTgt spid="45"/>
+                                          <p:spTgt spid="46"/>
                                         </p:tgtEl>
                                         <p:attrNameLst>
                                           <p:attrName>style.visibility</p:attrName>
@@ -6428,39 +6689,21 @@
                                   </p:childTnLst>
                                 </p:cTn>
                               </p:par>
-                            </p:childTnLst>
-                          </p:cTn>
-                        </p:par>
-                      </p:childTnLst>
-                    </p:cTn>
-                  </p:par>
-                  <p:par>
-                    <p:cTn id="51" fill="hold">
-                      <p:stCondLst>
-                        <p:cond delay="indefinite"/>
-                      </p:stCondLst>
-                      <p:childTnLst>
-                        <p:par>
-                          <p:cTn id="52" fill="hold">
-                            <p:stCondLst>
-                              <p:cond delay="0"/>
-                            </p:stCondLst>
-                            <p:childTnLst>
                               <p:par>
-                                <p:cTn id="53" presetID="1" presetClass="entr" presetSubtype="0" fill="hold" grpId="0" nodeType="clickEffect">
+                                <p:cTn id="51" presetID="1" presetClass="entr" presetSubtype="0" fill="hold" grpId="0" nodeType="withEffect">
                                   <p:stCondLst>
                                     <p:cond delay="0"/>
                                   </p:stCondLst>
                                   <p:childTnLst>
                                     <p:set>
                                       <p:cBhvr>
-                                        <p:cTn id="54" dur="1" fill="hold">
+                                        <p:cTn id="52" dur="1" fill="hold">
                                           <p:stCondLst>
                                             <p:cond delay="0"/>
                                           </p:stCondLst>
                                         </p:cTn>
                                         <p:tgtEl>
-                                          <p:spTgt spid="46"/>
+                                          <p:spTgt spid="47"/>
                                         </p:tgtEl>
                                         <p:attrNameLst>
                                           <p:attrName>style.visibility</p:attrName>
@@ -6474,7 +6717,34 @@
                                 </p:cTn>
                               </p:par>
                               <p:par>
-                                <p:cTn id="55" presetID="1" presetClass="exit" presetSubtype="0" fill="hold" grpId="1" nodeType="withEffect">
+                                <p:cTn id="53" presetID="1" presetClass="exit" presetSubtype="0" fill="hold" grpId="1" nodeType="withEffect">
+                                  <p:stCondLst>
+                                    <p:cond delay="0"/>
+                                  </p:stCondLst>
+                                  <p:childTnLst>
+                                    <p:set>
+                                      <p:cBhvr>
+                                        <p:cTn id="54" dur="1" fill="hold">
+                                          <p:stCondLst>
+                                            <p:cond delay="0"/>
+                                          </p:stCondLst>
+                                        </p:cTn>
+                                        <p:tgtEl>
+                                          <p:spTgt spid="47"/>
+                                        </p:tgtEl>
+                                        <p:attrNameLst>
+                                          <p:attrName>style.visibility</p:attrName>
+                                        </p:attrNameLst>
+                                      </p:cBhvr>
+                                      <p:to>
+                                        <p:strVal val="hidden"/>
+                                      </p:to>
+                                    </p:set>
+                                  </p:childTnLst>
+                                </p:cTn>
+                              </p:par>
+                              <p:par>
+                                <p:cTn id="55" presetID="1" presetClass="exit" presetSubtype="0" fill="hold" grpId="0" nodeType="withEffect">
                                   <p:stCondLst>
                                     <p:cond delay="0"/>
                                   </p:stCondLst>
@@ -6487,7 +6757,7 @@
                                           </p:stCondLst>
                                         </p:cTn>
                                         <p:tgtEl>
-                                          <p:spTgt spid="46"/>
+                                          <p:spTgt spid="48"/>
                                         </p:tgtEl>
                                         <p:attrNameLst>
                                           <p:attrName>style.visibility</p:attrName>
@@ -6514,7 +6784,7 @@
                                           </p:stCondLst>
                                         </p:cTn>
                                         <p:tgtEl>
-                                          <p:spTgt spid="47"/>
+                                          <p:spTgt spid="51"/>
                                         </p:tgtEl>
                                         <p:attrNameLst>
                                           <p:attrName>style.visibility</p:attrName>
@@ -6541,7 +6811,7 @@
                                           </p:stCondLst>
                                         </p:cTn>
                                         <p:tgtEl>
-                                          <p:spTgt spid="47"/>
+                                          <p:spTgt spid="51"/>
                                         </p:tgtEl>
                                         <p:attrNameLst>
                                           <p:attrName>style.visibility</p:attrName>
@@ -6568,7 +6838,7 @@
                                           </p:stCondLst>
                                         </p:cTn>
                                         <p:tgtEl>
-                                          <p:spTgt spid="48"/>
+                                          <p:spTgt spid="52"/>
                                         </p:tgtEl>
                                         <p:attrNameLst>
                                           <p:attrName>style.visibility</p:attrName>
@@ -6581,21 +6851,39 @@
                                   </p:childTnLst>
                                 </p:cTn>
                               </p:par>
+                            </p:childTnLst>
+                          </p:cTn>
+                        </p:par>
+                      </p:childTnLst>
+                    </p:cTn>
+                  </p:par>
+                  <p:par>
+                    <p:cTn id="63" fill="hold">
+                      <p:stCondLst>
+                        <p:cond delay="indefinite"/>
+                      </p:stCondLst>
+                      <p:childTnLst>
+                        <p:par>
+                          <p:cTn id="64" fill="hold">
+                            <p:stCondLst>
+                              <p:cond delay="0"/>
+                            </p:stCondLst>
+                            <p:childTnLst>
                               <p:par>
-                                <p:cTn id="63" presetID="1" presetClass="entr" presetSubtype="0" fill="hold" grpId="0" nodeType="withEffect">
+                                <p:cTn id="65" presetID="1" presetClass="entr" presetSubtype="0" fill="hold" grpId="0" nodeType="clickEffect">
                                   <p:stCondLst>
                                     <p:cond delay="0"/>
                                   </p:stCondLst>
                                   <p:childTnLst>
                                     <p:set>
                                       <p:cBhvr>
-                                        <p:cTn id="64" dur="1" fill="hold">
+                                        <p:cTn id="66" dur="1" fill="hold">
                                           <p:stCondLst>
                                             <p:cond delay="0"/>
                                           </p:stCondLst>
                                         </p:cTn>
                                         <p:tgtEl>
-                                          <p:spTgt spid="51"/>
+                                          <p:spTgt spid="30"/>
                                         </p:tgtEl>
                                         <p:attrNameLst>
                                           <p:attrName>style.visibility</p:attrName>
@@ -6609,20 +6897,20 @@
                                 </p:cTn>
                               </p:par>
                               <p:par>
-                                <p:cTn id="65" presetID="1" presetClass="exit" presetSubtype="0" fill="hold" grpId="1" nodeType="withEffect">
+                                <p:cTn id="67" presetID="1" presetClass="exit" presetSubtype="0" fill="hold" grpId="1" nodeType="withEffect">
                                   <p:stCondLst>
                                     <p:cond delay="0"/>
                                   </p:stCondLst>
                                   <p:childTnLst>
                                     <p:set>
                                       <p:cBhvr>
-                                        <p:cTn id="66" dur="1" fill="hold">
+                                        <p:cTn id="68" dur="1" fill="hold">
                                           <p:stCondLst>
                                             <p:cond delay="0"/>
                                           </p:stCondLst>
                                         </p:cTn>
                                         <p:tgtEl>
-                                          <p:spTgt spid="51"/>
+                                          <p:spTgt spid="30"/>
                                         </p:tgtEl>
                                         <p:attrNameLst>
                                           <p:attrName>style.visibility</p:attrName>
@@ -6635,48 +6923,66 @@
                                   </p:childTnLst>
                                 </p:cTn>
                               </p:par>
+                            </p:childTnLst>
+                          </p:cTn>
+                        </p:par>
+                      </p:childTnLst>
+                    </p:cTn>
+                  </p:par>
+                  <p:par>
+                    <p:cTn id="69" fill="hold">
+                      <p:stCondLst>
+                        <p:cond delay="indefinite"/>
+                      </p:stCondLst>
+                      <p:childTnLst>
+                        <p:par>
+                          <p:cTn id="70" fill="hold">
+                            <p:stCondLst>
+                              <p:cond delay="0"/>
+                            </p:stCondLst>
+                            <p:childTnLst>
                               <p:par>
-                                <p:cTn id="67" presetID="1" presetClass="exit" presetSubtype="0" fill="hold" grpId="0" nodeType="withEffect">
+                                <p:cTn id="71" presetID="1" presetClass="entr" presetSubtype="0" fill="hold" grpId="0" nodeType="clickEffect">
                                   <p:stCondLst>
                                     <p:cond delay="0"/>
                                   </p:stCondLst>
                                   <p:childTnLst>
                                     <p:set>
                                       <p:cBhvr>
-                                        <p:cTn id="68" dur="1" fill="hold">
+                                        <p:cTn id="72" dur="1" fill="hold">
                                           <p:stCondLst>
                                             <p:cond delay="0"/>
                                           </p:stCondLst>
                                         </p:cTn>
                                         <p:tgtEl>
-                                          <p:spTgt spid="52"/>
+                                          <p:spTgt spid="31"/>
                                         </p:tgtEl>
                                         <p:attrNameLst>
                                           <p:attrName>style.visibility</p:attrName>
                                         </p:attrNameLst>
                                       </p:cBhvr>
                                       <p:to>
-                                        <p:strVal val="hidden"/>
+                                        <p:strVal val="visible"/>
                                       </p:to>
                                     </p:set>
                                   </p:childTnLst>
                                 </p:cTn>
                               </p:par>
                               <p:par>
-                                <p:cTn id="69" presetID="1" presetClass="exit" presetSubtype="0" fill="hold" grpId="0" nodeType="withEffect">
+                                <p:cTn id="73" presetID="1" presetClass="exit" presetSubtype="0" fill="hold" grpId="1" nodeType="withEffect">
                                   <p:stCondLst>
                                     <p:cond delay="0"/>
                                   </p:stCondLst>
                                   <p:childTnLst>
                                     <p:set>
                                       <p:cBhvr>
-                                        <p:cTn id="70" dur="1" fill="hold">
+                                        <p:cTn id="74" dur="1" fill="hold">
                                           <p:stCondLst>
                                             <p:cond delay="0"/>
                                           </p:stCondLst>
                                         </p:cTn>
                                         <p:tgtEl>
-                                          <p:spTgt spid="53"/>
+                                          <p:spTgt spid="31"/>
                                         </p:tgtEl>
                                         <p:attrNameLst>
                                           <p:attrName>style.visibility</p:attrName>
@@ -6719,7 +7025,6 @@
     <p:bldLst>
       <p:bldP spid="5" grpId="0" animBg="1"/>
       <p:bldP spid="6" grpId="0" animBg="1"/>
-      <p:bldP spid="17" grpId="0" animBg="1"/>
       <p:bldP spid="18" grpId="0" animBg="1"/>
       <p:bldP spid="19" grpId="0" animBg="1"/>
       <p:bldP spid="20" grpId="0" animBg="1"/>
@@ -6733,10 +7038,8 @@
       <p:bldP spid="33" grpId="0" animBg="1"/>
       <p:bldP spid="34" grpId="0" animBg="1"/>
       <p:bldP spid="38" grpId="0"/>
-      <p:bldP spid="40" grpId="0" animBg="1"/>
       <p:bldP spid="42" grpId="0" animBg="1"/>
       <p:bldP spid="43" grpId="0" animBg="1"/>
-      <p:bldP spid="44" grpId="0" animBg="1"/>
       <p:bldP spid="45" grpId="0" animBg="1"/>
       <p:bldP spid="45" grpId="1" animBg="1"/>
       <p:bldP spid="46" grpId="0" animBg="1"/>
@@ -6747,7 +7050,10 @@
       <p:bldP spid="51" grpId="0"/>
       <p:bldP spid="51" grpId="1"/>
       <p:bldP spid="52" grpId="0" animBg="1"/>
-      <p:bldP spid="53" grpId="0" animBg="1"/>
+      <p:bldP spid="30" grpId="0" animBg="1"/>
+      <p:bldP spid="30" grpId="1" animBg="1"/>
+      <p:bldP spid="31" grpId="0" animBg="1"/>
+      <p:bldP spid="31" grpId="1" animBg="1"/>
     </p:bldLst>
   </p:timing>
 </p:sld>
@@ -6780,8 +7086,8 @@
         </p:nvSpPr>
         <p:spPr bwMode="auto">
           <a:xfrm>
-            <a:off x="728768" y="1440950"/>
-            <a:ext cx="10115" cy="3904336"/>
+            <a:off x="728768" y="1440949"/>
+            <a:ext cx="0" cy="4408867"/>
           </a:xfrm>
           <a:prstGeom prst="line">
             <a:avLst/>
@@ -6897,134 +7203,6 @@
       </p:sp>
       <p:sp>
         <p:nvSpPr>
-          <p:cNvPr id="17" name="Rectangle 16"/>
-          <p:cNvSpPr/>
-          <p:nvPr/>
-        </p:nvSpPr>
-        <p:spPr>
-          <a:xfrm>
-            <a:off x="603890" y="1721228"/>
-            <a:ext cx="225619" cy="3348432"/>
-          </a:xfrm>
-          <a:prstGeom prst="rect">
-            <a:avLst/>
-          </a:prstGeom>
-          <a:solidFill>
-            <a:schemeClr val="accent2">
-              <a:lumMod val="40000"/>
-              <a:lumOff val="60000"/>
-            </a:schemeClr>
-          </a:solidFill>
-          <a:ln>
-            <a:solidFill>
-              <a:schemeClr val="accent2">
-                <a:lumMod val="60000"/>
-                <a:lumOff val="40000"/>
-              </a:schemeClr>
-            </a:solidFill>
-          </a:ln>
-        </p:spPr>
-        <p:style>
-          <a:lnRef idx="2">
-            <a:schemeClr val="accent4"/>
-          </a:lnRef>
-          <a:fillRef idx="1">
-            <a:schemeClr val="lt1"/>
-          </a:fillRef>
-          <a:effectRef idx="0">
-            <a:schemeClr val="accent4"/>
-          </a:effectRef>
-          <a:fontRef idx="minor">
-            <a:schemeClr val="dk1"/>
-          </a:fontRef>
-        </p:style>
-        <p:txBody>
-          <a:bodyPr rtlCol="0" anchor="ctr"/>
-          <a:lstStyle/>
-          <a:p>
-            <a:pPr algn="ctr" defTabSz="872733"/>
-            <a:endParaRPr lang="en-US" sz="1500">
-              <a:solidFill>
-                <a:prstClr val="black"/>
-              </a:solidFill>
-            </a:endParaRPr>
-          </a:p>
-        </p:txBody>
-      </p:sp>
-      <p:sp>
-        <p:nvSpPr>
-          <p:cNvPr id="18" name="Text Box 11"/>
-          <p:cNvSpPr txBox="1">
-            <a:spLocks noChangeArrowheads="1"/>
-          </p:cNvSpPr>
-          <p:nvPr/>
-        </p:nvSpPr>
-        <p:spPr bwMode="auto">
-          <a:xfrm>
-            <a:off x="5294250" y="2812540"/>
-            <a:ext cx="1674216" cy="600164"/>
-          </a:xfrm>
-          <a:prstGeom prst="rect">
-            <a:avLst/>
-          </a:prstGeom>
-          <a:ln w="19050">
-            <a:headEnd/>
-            <a:tailEnd/>
-          </a:ln>
-        </p:spPr>
-        <p:style>
-          <a:lnRef idx="1">
-            <a:schemeClr val="accent3"/>
-          </a:lnRef>
-          <a:fillRef idx="2">
-            <a:schemeClr val="accent3"/>
-          </a:fillRef>
-          <a:effectRef idx="1">
-            <a:schemeClr val="accent3"/>
-          </a:effectRef>
-          <a:fontRef idx="minor">
-            <a:schemeClr val="dk1"/>
-          </a:fontRef>
-        </p:style>
-        <p:txBody>
-          <a:bodyPr wrap="square" tIns="182880" bIns="182880">
-            <a:spAutoFit/>
-          </a:bodyPr>
-          <a:lstStyle/>
-          <a:p>
-            <a:pPr algn="ctr" defTabSz="872733">
-              <a:spcBef>
-                <a:spcPct val="50000"/>
-              </a:spcBef>
-              <a:buFont typeface="Wingdings" pitchFamily="2" charset="2"/>
-              <a:buNone/>
-            </a:pPr>
-            <a:r>
-              <a:rPr lang="en-US" sz="1500" dirty="0">
-                <a:solidFill>
-                  <a:prstClr val="black"/>
-                </a:solidFill>
-              </a:rPr>
-              <a:t>:</a:t>
-            </a:r>
-            <a:r>
-              <a:rPr lang="en-US" sz="1500" dirty="0" err="1">
-                <a:solidFill>
-                  <a:prstClr val="black"/>
-                </a:solidFill>
-              </a:rPr>
-              <a:t>UnmarkCommand</a:t>
-            </a:r>
-            <a:endParaRPr lang="en-US" sz="1500" dirty="0">
-              <a:solidFill>
-                <a:prstClr val="black"/>
-              </a:solidFill>
-            </a:endParaRPr>
-          </a:p>
-        </p:txBody>
-      </p:sp>
-      <p:sp>
-        <p:nvSpPr>
           <p:cNvPr id="19" name="Line 13"/>
           <p:cNvSpPr>
             <a:spLocks noChangeShapeType="1"/>
@@ -7034,7 +7212,7 @@
         <p:spPr bwMode="auto">
           <a:xfrm flipH="1">
             <a:off x="3018095" y="2137789"/>
-            <a:ext cx="8589" cy="1590924"/>
+            <a:ext cx="0" cy="1590924"/>
           </a:xfrm>
           <a:prstGeom prst="line">
             <a:avLst/>
@@ -7087,8 +7265,8 @@
         </p:nvSpPr>
         <p:spPr bwMode="auto">
           <a:xfrm flipV="1">
-            <a:off x="823868" y="1898263"/>
-            <a:ext cx="1747815" cy="12191"/>
+            <a:off x="738884" y="1898262"/>
+            <a:ext cx="1832800" cy="0"/>
           </a:xfrm>
           <a:prstGeom prst="line">
             <a:avLst/>
@@ -7118,54 +7296,6 @@
       </p:sp>
       <p:sp>
         <p:nvSpPr>
-          <p:cNvPr id="21" name="Text Box 25"/>
-          <p:cNvSpPr txBox="1">
-            <a:spLocks noChangeArrowheads="1"/>
-          </p:cNvSpPr>
-          <p:nvPr/>
-        </p:nvSpPr>
-        <p:spPr bwMode="auto">
-          <a:xfrm>
-            <a:off x="6212959" y="4044402"/>
-            <a:ext cx="2062529" cy="323165"/>
-          </a:xfrm>
-          <a:prstGeom prst="rect">
-            <a:avLst/>
-          </a:prstGeom>
-          <a:noFill/>
-          <a:ln w="12700" algn="ctr">
-            <a:noFill/>
-            <a:miter lim="800000"/>
-            <a:headEnd/>
-            <a:tailEnd/>
-          </a:ln>
-        </p:spPr>
-        <p:txBody>
-          <a:bodyPr wrap="square">
-            <a:spAutoFit/>
-          </a:bodyPr>
-          <a:lstStyle/>
-          <a:p>
-            <a:pPr defTabSz="872733">
-              <a:spcBef>
-                <a:spcPct val="50000"/>
-              </a:spcBef>
-              <a:buFont typeface="Wingdings" pitchFamily="2" charset="2"/>
-              <a:buNone/>
-            </a:pPr>
-            <a:r>
-              <a:rPr lang="en-US" sz="1500" i="1" dirty="0" err="1"/>
-              <a:t>unmarkAsBought</a:t>
-            </a:r>
-            <a:r>
-              <a:rPr lang="en-US" sz="1500" i="1" dirty="0"/>
-              <a:t>(index)</a:t>
-            </a:r>
-          </a:p>
-        </p:txBody>
-      </p:sp>
-      <p:sp>
-        <p:nvSpPr>
           <p:cNvPr id="24" name="Line 15"/>
           <p:cNvSpPr>
             <a:spLocks noChangeShapeType="1"/>
@@ -7174,8 +7304,8 @@
         </p:nvSpPr>
         <p:spPr bwMode="auto">
           <a:xfrm flipV="1">
-            <a:off x="3194466" y="3109931"/>
-            <a:ext cx="2099784" cy="30169"/>
+            <a:off x="3026683" y="3119622"/>
+            <a:ext cx="2148511" cy="0"/>
           </a:xfrm>
           <a:prstGeom prst="line">
             <a:avLst/>
@@ -7215,7 +7345,7 @@
         </p:nvSpPr>
         <p:spPr bwMode="auto">
           <a:xfrm>
-            <a:off x="808004" y="2320801"/>
+            <a:off x="762000" y="2320801"/>
             <a:ext cx="2500554" cy="323165"/>
           </a:xfrm>
           <a:prstGeom prst="rect">
@@ -7263,55 +7393,6 @@
       </p:sp>
       <p:sp>
         <p:nvSpPr>
-          <p:cNvPr id="29" name="Text Box 25"/>
-          <p:cNvSpPr txBox="1">
-            <a:spLocks noChangeArrowheads="1"/>
-          </p:cNvSpPr>
-          <p:nvPr/>
-        </p:nvSpPr>
-        <p:spPr bwMode="auto">
-          <a:xfrm>
-            <a:off x="965943" y="3019896"/>
-            <a:ext cx="1710047" cy="553998"/>
-          </a:xfrm>
-          <a:prstGeom prst="rect">
-            <a:avLst/>
-          </a:prstGeom>
-          <a:noFill/>
-          <a:ln w="12700" algn="ctr">
-            <a:noFill/>
-            <a:miter lim="800000"/>
-            <a:headEnd/>
-            <a:tailEnd/>
-          </a:ln>
-        </p:spPr>
-        <p:txBody>
-          <a:bodyPr wrap="square">
-            <a:spAutoFit/>
-          </a:bodyPr>
-          <a:lstStyle/>
-          <a:p>
-            <a:pPr defTabSz="872733">
-              <a:spcBef>
-                <a:spcPct val="50000"/>
-              </a:spcBef>
-              <a:buFont typeface="Wingdings" pitchFamily="2" charset="2"/>
-              <a:buNone/>
-            </a:pPr>
-            <a:r>
-              <a:rPr lang="en-US" sz="1500" i="1" dirty="0"/>
-              <a:t>return reference to </a:t>
-            </a:r>
-            <a:r>
-              <a:rPr lang="en-US" sz="1500" i="1" dirty="0" err="1"/>
-              <a:t>UnmarkCommand</a:t>
-            </a:r>
-            <a:endParaRPr lang="en-US" sz="1500" i="1" dirty="0"/>
-          </a:p>
-        </p:txBody>
-      </p:sp>
-      <p:sp>
-        <p:nvSpPr>
           <p:cNvPr id="33" name="Line 13"/>
           <p:cNvSpPr>
             <a:spLocks noChangeShapeType="1"/>
@@ -7320,8 +7401,8 @@
         </p:nvSpPr>
         <p:spPr bwMode="auto">
           <a:xfrm flipH="1">
-            <a:off x="6071965" y="3396473"/>
-            <a:ext cx="4560" cy="1893221"/>
+            <a:off x="5910533" y="3393440"/>
+            <a:ext cx="0" cy="2204721"/>
           </a:xfrm>
           <a:prstGeom prst="line">
             <a:avLst/>
@@ -7374,8 +7455,8 @@
         </p:nvSpPr>
         <p:spPr bwMode="auto">
           <a:xfrm flipV="1">
-            <a:off x="863760" y="2696243"/>
-            <a:ext cx="2040971" cy="1"/>
+            <a:off x="738882" y="2683404"/>
+            <a:ext cx="2287802" cy="0"/>
           </a:xfrm>
           <a:prstGeom prst="line">
             <a:avLst/>
@@ -7449,61 +7530,6 @@
       </p:sp>
       <p:sp>
         <p:nvSpPr>
-          <p:cNvPr id="40" name="Rectangle 39"/>
-          <p:cNvSpPr/>
-          <p:nvPr/>
-        </p:nvSpPr>
-        <p:spPr>
-          <a:xfrm>
-            <a:off x="5946284" y="4066313"/>
-            <a:ext cx="251361" cy="878804"/>
-          </a:xfrm>
-          <a:prstGeom prst="rect">
-            <a:avLst/>
-          </a:prstGeom>
-          <a:solidFill>
-            <a:schemeClr val="accent3">
-              <a:lumMod val="20000"/>
-              <a:lumOff val="80000"/>
-            </a:schemeClr>
-          </a:solidFill>
-          <a:ln>
-            <a:solidFill>
-              <a:schemeClr val="accent3">
-                <a:lumMod val="75000"/>
-              </a:schemeClr>
-            </a:solidFill>
-          </a:ln>
-        </p:spPr>
-        <p:style>
-          <a:lnRef idx="2">
-            <a:schemeClr val="accent4"/>
-          </a:lnRef>
-          <a:fillRef idx="1">
-            <a:schemeClr val="lt1"/>
-          </a:fillRef>
-          <a:effectRef idx="0">
-            <a:schemeClr val="accent4"/>
-          </a:effectRef>
-          <a:fontRef idx="minor">
-            <a:schemeClr val="dk1"/>
-          </a:fontRef>
-        </p:style>
-        <p:txBody>
-          <a:bodyPr rtlCol="0" anchor="ctr"/>
-          <a:lstStyle/>
-          <a:p>
-            <a:pPr algn="ctr" defTabSz="872733"/>
-            <a:endParaRPr lang="en-US" sz="1500">
-              <a:solidFill>
-                <a:prstClr val="black"/>
-              </a:solidFill>
-            </a:endParaRPr>
-          </a:p>
-        </p:txBody>
-      </p:sp>
-      <p:sp>
-        <p:nvSpPr>
           <p:cNvPr id="42" name="Text Box 11">
             <a:extLst>
               <a:ext uri="{FF2B5EF4-FFF2-40B4-BE49-F238E27FC236}">
@@ -7518,7 +7544,7 @@
         </p:nvSpPr>
         <p:spPr bwMode="auto">
           <a:xfrm>
-            <a:off x="7467600" y="3112622"/>
+            <a:off x="7239000" y="3112622"/>
             <a:ext cx="1676400" cy="600164"/>
           </a:xfrm>
           <a:prstGeom prst="rect">
@@ -7661,67 +7687,6 @@
       </p:sp>
       <p:sp>
         <p:nvSpPr>
-          <p:cNvPr id="44" name="Rectangle 43">
-            <a:extLst>
-              <a:ext uri="{FF2B5EF4-FFF2-40B4-BE49-F238E27FC236}">
-                <a16:creationId xmlns:a16="http://schemas.microsoft.com/office/drawing/2014/main" id="{1ABAE2EE-0C6F-40C9-9F83-C6E45146189B}"/>
-              </a:ext>
-            </a:extLst>
-          </p:cNvPr>
-          <p:cNvSpPr/>
-          <p:nvPr/>
-        </p:nvSpPr>
-        <p:spPr>
-          <a:xfrm>
-            <a:off x="2888219" y="2698465"/>
-            <a:ext cx="286905" cy="893938"/>
-          </a:xfrm>
-          <a:prstGeom prst="rect">
-            <a:avLst/>
-          </a:prstGeom>
-          <a:solidFill>
-            <a:schemeClr val="accent4">
-              <a:lumMod val="40000"/>
-              <a:lumOff val="60000"/>
-            </a:schemeClr>
-          </a:solidFill>
-          <a:ln>
-            <a:solidFill>
-              <a:schemeClr val="accent4">
-                <a:lumMod val="75000"/>
-              </a:schemeClr>
-            </a:solidFill>
-          </a:ln>
-        </p:spPr>
-        <p:style>
-          <a:lnRef idx="2">
-            <a:schemeClr val="accent4"/>
-          </a:lnRef>
-          <a:fillRef idx="1">
-            <a:schemeClr val="lt1"/>
-          </a:fillRef>
-          <a:effectRef idx="0">
-            <a:schemeClr val="accent4"/>
-          </a:effectRef>
-          <a:fontRef idx="minor">
-            <a:schemeClr val="dk1"/>
-          </a:fontRef>
-        </p:style>
-        <p:txBody>
-          <a:bodyPr rtlCol="0" anchor="ctr"/>
-          <a:lstStyle/>
-          <a:p>
-            <a:pPr algn="ctr" defTabSz="872733"/>
-            <a:endParaRPr lang="en-US" sz="1500">
-              <a:solidFill>
-                <a:prstClr val="black"/>
-              </a:solidFill>
-            </a:endParaRPr>
-          </a:p>
-        </p:txBody>
-      </p:sp>
-      <p:sp>
-        <p:nvSpPr>
           <p:cNvPr id="45" name="Line 15">
             <a:extLst>
               <a:ext uri="{FF2B5EF4-FFF2-40B4-BE49-F238E27FC236}">
@@ -7736,8 +7701,8 @@
         </p:nvSpPr>
         <p:spPr bwMode="auto">
           <a:xfrm>
-            <a:off x="875317" y="4066312"/>
-            <a:ext cx="5033504" cy="14959"/>
+            <a:off x="738882" y="4056965"/>
+            <a:ext cx="5187427" cy="0"/>
           </a:xfrm>
           <a:prstGeom prst="line">
             <a:avLst/>
@@ -7782,9 +7747,9 @@
           <p:nvPr/>
         </p:nvSpPr>
         <p:spPr bwMode="auto">
-          <a:xfrm>
-            <a:off x="6197645" y="4367567"/>
-            <a:ext cx="1970403" cy="11401"/>
+          <a:xfrm flipV="1">
+            <a:off x="5926309" y="4350048"/>
+            <a:ext cx="2144362" cy="0"/>
           </a:xfrm>
           <a:prstGeom prst="line">
             <a:avLst/>
@@ -7816,60 +7781,6 @@
       </p:sp>
       <p:sp>
         <p:nvSpPr>
-          <p:cNvPr id="47" name="Text Box 25">
-            <a:extLst>
-              <a:ext uri="{FF2B5EF4-FFF2-40B4-BE49-F238E27FC236}">
-                <a16:creationId xmlns:a16="http://schemas.microsoft.com/office/drawing/2014/main" id="{342B431E-151F-4A55-A1AE-57F6FE56D1EF}"/>
-              </a:ext>
-            </a:extLst>
-          </p:cNvPr>
-          <p:cNvSpPr txBox="1">
-            <a:spLocks noChangeArrowheads="1"/>
-          </p:cNvSpPr>
-          <p:nvPr/>
-        </p:nvSpPr>
-        <p:spPr bwMode="auto">
-          <a:xfrm>
-            <a:off x="3174259" y="2826789"/>
-            <a:ext cx="2263876" cy="323165"/>
-          </a:xfrm>
-          <a:prstGeom prst="rect">
-            <a:avLst/>
-          </a:prstGeom>
-          <a:noFill/>
-          <a:ln w="12700" algn="ctr">
-            <a:noFill/>
-            <a:miter lim="800000"/>
-            <a:headEnd/>
-            <a:tailEnd/>
-          </a:ln>
-        </p:spPr>
-        <p:txBody>
-          <a:bodyPr wrap="square">
-            <a:spAutoFit/>
-          </a:bodyPr>
-          <a:lstStyle/>
-          <a:p>
-            <a:pPr defTabSz="872733">
-              <a:spcBef>
-                <a:spcPct val="50000"/>
-              </a:spcBef>
-              <a:buFont typeface="Wingdings" pitchFamily="2" charset="2"/>
-              <a:buNone/>
-            </a:pPr>
-            <a:r>
-              <a:rPr lang="en-US" sz="1500" i="1" dirty="0" err="1"/>
-              <a:t>UnmarkCommand</a:t>
-            </a:r>
-            <a:r>
-              <a:rPr lang="en-US" sz="1500" i="1" dirty="0"/>
-              <a:t>(index)</a:t>
-            </a:r>
-          </a:p>
-        </p:txBody>
-      </p:sp>
-      <p:sp>
-        <p:nvSpPr>
           <p:cNvPr id="48" name="Line 16">
             <a:extLst>
               <a:ext uri="{FF2B5EF4-FFF2-40B4-BE49-F238E27FC236}">
@@ -7884,8 +7795,8 @@
         </p:nvSpPr>
         <p:spPr bwMode="auto">
           <a:xfrm flipH="1">
-            <a:off x="852246" y="3573169"/>
-            <a:ext cx="2016629" cy="7945"/>
+            <a:off x="747472" y="3559767"/>
+            <a:ext cx="2267695" cy="0"/>
           </a:xfrm>
           <a:prstGeom prst="line">
             <a:avLst/>
@@ -8065,9 +7976,9 @@
           <p:nvPr/>
         </p:nvSpPr>
         <p:spPr bwMode="auto">
-          <a:xfrm>
-            <a:off x="8299271" y="3740237"/>
-            <a:ext cx="0" cy="1605048"/>
+          <a:xfrm flipH="1">
+            <a:off x="8056880" y="3740236"/>
+            <a:ext cx="0" cy="2109571"/>
           </a:xfrm>
           <a:prstGeom prst="line">
             <a:avLst/>
@@ -8110,66 +8021,6 @@
           </a:p>
         </p:txBody>
       </p:sp>
-      <p:sp>
-        <p:nvSpPr>
-          <p:cNvPr id="53" name="Rectangle 52">
-            <a:extLst>
-              <a:ext uri="{FF2B5EF4-FFF2-40B4-BE49-F238E27FC236}">
-                <a16:creationId xmlns:a16="http://schemas.microsoft.com/office/drawing/2014/main" id="{E7397DF1-A503-43B8-9D46-710440F45D61}"/>
-              </a:ext>
-            </a:extLst>
-          </p:cNvPr>
-          <p:cNvSpPr/>
-          <p:nvPr/>
-        </p:nvSpPr>
-        <p:spPr>
-          <a:xfrm>
-            <a:off x="8173591" y="4367567"/>
-            <a:ext cx="251361" cy="697392"/>
-          </a:xfrm>
-          <a:prstGeom prst="rect">
-            <a:avLst/>
-          </a:prstGeom>
-          <a:solidFill>
-            <a:schemeClr val="bg2">
-              <a:lumMod val="75000"/>
-            </a:schemeClr>
-          </a:solidFill>
-          <a:ln>
-            <a:solidFill>
-              <a:schemeClr val="bg2">
-                <a:lumMod val="50000"/>
-              </a:schemeClr>
-            </a:solidFill>
-          </a:ln>
-        </p:spPr>
-        <p:style>
-          <a:lnRef idx="2">
-            <a:schemeClr val="accent4"/>
-          </a:lnRef>
-          <a:fillRef idx="1">
-            <a:schemeClr val="lt1"/>
-          </a:fillRef>
-          <a:effectRef idx="0">
-            <a:schemeClr val="accent4"/>
-          </a:effectRef>
-          <a:fontRef idx="minor">
-            <a:schemeClr val="dk1"/>
-          </a:fontRef>
-        </p:style>
-        <p:txBody>
-          <a:bodyPr rtlCol="0" anchor="ctr"/>
-          <a:lstStyle/>
-          <a:p>
-            <a:pPr algn="ctr" defTabSz="872733"/>
-            <a:endParaRPr lang="en-US" sz="1500">
-              <a:solidFill>
-                <a:prstClr val="black"/>
-              </a:solidFill>
-            </a:endParaRPr>
-          </a:p>
-        </p:txBody>
-      </p:sp>
       <p:cxnSp>
         <p:nvCxnSpPr>
           <p:cNvPr id="54" name="Straight Connector 53">
@@ -8184,7 +8035,7 @@
         </p:nvCxnSpPr>
         <p:spPr>
           <a:xfrm rot="16200000" flipV="1">
-            <a:off x="5927144" y="5196333"/>
+            <a:off x="5786706" y="5418588"/>
             <a:ext cx="284430" cy="267655"/>
           </a:xfrm>
           <a:prstGeom prst="line">
@@ -8227,7 +8078,7 @@
         </p:nvCxnSpPr>
         <p:spPr>
           <a:xfrm rot="5400000">
-            <a:off x="5920554" y="5200827"/>
+            <a:off x="5780116" y="5423082"/>
             <a:ext cx="288175" cy="266007"/>
           </a:xfrm>
           <a:prstGeom prst="line">
@@ -8256,10 +8107,347 @@
           </a:fontRef>
         </p:style>
       </p:cxnSp>
+      <p:sp>
+        <p:nvSpPr>
+          <p:cNvPr id="30" name="Line 15">
+            <a:extLst>
+              <a:ext uri="{FF2B5EF4-FFF2-40B4-BE49-F238E27FC236}">
+                <a16:creationId xmlns:a16="http://schemas.microsoft.com/office/drawing/2014/main" id="{E61F55CE-8BAB-4C52-8D9F-72914F7709D0}"/>
+              </a:ext>
+            </a:extLst>
+          </p:cNvPr>
+          <p:cNvSpPr>
+            <a:spLocks noChangeShapeType="1"/>
+          </p:cNvSpPr>
+          <p:nvPr/>
+        </p:nvSpPr>
+        <p:spPr bwMode="auto">
+          <a:xfrm flipH="1" flipV="1">
+            <a:off x="5910533" y="4876800"/>
+            <a:ext cx="2160138" cy="0"/>
+          </a:xfrm>
+          <a:prstGeom prst="line">
+            <a:avLst/>
+          </a:prstGeom>
+          <a:noFill/>
+          <a:ln w="19050">
+            <a:solidFill>
+              <a:schemeClr val="bg2">
+                <a:lumMod val="50000"/>
+              </a:schemeClr>
+            </a:solidFill>
+            <a:prstDash val="sysDash"/>
+            <a:round/>
+            <a:headEnd/>
+            <a:tailEnd type="triangle" w="lg" len="lg"/>
+          </a:ln>
+        </p:spPr>
+        <p:txBody>
+          <a:bodyPr/>
+          <a:lstStyle/>
+          <a:p>
+            <a:pPr defTabSz="872733"/>
+            <a:endParaRPr lang="en-US" sz="1500">
+              <a:solidFill>
+                <a:prstClr val="black"/>
+              </a:solidFill>
+            </a:endParaRPr>
+          </a:p>
+        </p:txBody>
+      </p:sp>
+      <p:sp>
+        <p:nvSpPr>
+          <p:cNvPr id="31" name="Line 15">
+            <a:extLst>
+              <a:ext uri="{FF2B5EF4-FFF2-40B4-BE49-F238E27FC236}">
+                <a16:creationId xmlns:a16="http://schemas.microsoft.com/office/drawing/2014/main" id="{A46E2A60-C793-4B50-A5C3-6230067649BA}"/>
+              </a:ext>
+            </a:extLst>
+          </p:cNvPr>
+          <p:cNvSpPr>
+            <a:spLocks noChangeShapeType="1"/>
+          </p:cNvSpPr>
+          <p:nvPr/>
+        </p:nvSpPr>
+        <p:spPr bwMode="auto">
+          <a:xfrm flipH="1">
+            <a:off x="738883" y="5230126"/>
+            <a:ext cx="5171650" cy="0"/>
+          </a:xfrm>
+          <a:prstGeom prst="line">
+            <a:avLst/>
+          </a:prstGeom>
+          <a:noFill/>
+          <a:ln w="19050">
+            <a:solidFill>
+              <a:schemeClr val="accent3">
+                <a:lumMod val="75000"/>
+              </a:schemeClr>
+            </a:solidFill>
+            <a:prstDash val="sysDash"/>
+            <a:round/>
+            <a:headEnd/>
+            <a:tailEnd type="triangle" w="lg" len="lg"/>
+          </a:ln>
+        </p:spPr>
+        <p:txBody>
+          <a:bodyPr/>
+          <a:lstStyle/>
+          <a:p>
+            <a:pPr defTabSz="872733"/>
+            <a:endParaRPr lang="en-US" sz="1500">
+              <a:solidFill>
+                <a:prstClr val="black"/>
+              </a:solidFill>
+            </a:endParaRPr>
+          </a:p>
+        </p:txBody>
+      </p:sp>
+      <p:sp>
+        <p:nvSpPr>
+          <p:cNvPr id="28" name="Text Box 25">
+            <a:extLst>
+              <a:ext uri="{FF2B5EF4-FFF2-40B4-BE49-F238E27FC236}">
+                <a16:creationId xmlns:a16="http://schemas.microsoft.com/office/drawing/2014/main" id="{C55D073A-D904-44D4-A449-45BCF5FC7DD2}"/>
+              </a:ext>
+            </a:extLst>
+          </p:cNvPr>
+          <p:cNvSpPr txBox="1">
+            <a:spLocks noChangeArrowheads="1"/>
+          </p:cNvSpPr>
+          <p:nvPr/>
+        </p:nvSpPr>
+        <p:spPr bwMode="auto">
+          <a:xfrm>
+            <a:off x="965943" y="3019896"/>
+            <a:ext cx="1710047" cy="553998"/>
+          </a:xfrm>
+          <a:prstGeom prst="rect">
+            <a:avLst/>
+          </a:prstGeom>
+          <a:noFill/>
+          <a:ln w="12700" algn="ctr">
+            <a:noFill/>
+            <a:miter lim="800000"/>
+            <a:headEnd/>
+            <a:tailEnd/>
+          </a:ln>
+        </p:spPr>
+        <p:txBody>
+          <a:bodyPr wrap="square">
+            <a:spAutoFit/>
+          </a:bodyPr>
+          <a:lstStyle/>
+          <a:p>
+            <a:pPr defTabSz="872733">
+              <a:spcBef>
+                <a:spcPct val="50000"/>
+              </a:spcBef>
+              <a:buFont typeface="Wingdings" pitchFamily="2" charset="2"/>
+              <a:buNone/>
+            </a:pPr>
+            <a:r>
+              <a:rPr lang="en-US" sz="1500" i="1" dirty="0"/>
+              <a:t>return reference to </a:t>
+            </a:r>
+            <a:r>
+              <a:rPr lang="en-US" sz="1500" i="1" dirty="0" err="1"/>
+              <a:t>UnmarkCommand</a:t>
+            </a:r>
+            <a:endParaRPr lang="en-US" sz="1500" i="1" dirty="0"/>
+          </a:p>
+        </p:txBody>
+      </p:sp>
+      <p:sp>
+        <p:nvSpPr>
+          <p:cNvPr id="32" name="Text Box 25">
+            <a:extLst>
+              <a:ext uri="{FF2B5EF4-FFF2-40B4-BE49-F238E27FC236}">
+                <a16:creationId xmlns:a16="http://schemas.microsoft.com/office/drawing/2014/main" id="{BB4C268C-B14E-47E4-88B4-F475ED65F1DC}"/>
+              </a:ext>
+            </a:extLst>
+          </p:cNvPr>
+          <p:cNvSpPr txBox="1">
+            <a:spLocks noChangeArrowheads="1"/>
+          </p:cNvSpPr>
+          <p:nvPr/>
+        </p:nvSpPr>
+        <p:spPr bwMode="auto">
+          <a:xfrm>
+            <a:off x="3015167" y="2764472"/>
+            <a:ext cx="2148510" cy="323165"/>
+          </a:xfrm>
+          <a:prstGeom prst="rect">
+            <a:avLst/>
+          </a:prstGeom>
+          <a:noFill/>
+          <a:ln w="12700" algn="ctr">
+            <a:noFill/>
+            <a:miter lim="800000"/>
+            <a:headEnd/>
+            <a:tailEnd/>
+          </a:ln>
+        </p:spPr>
+        <p:txBody>
+          <a:bodyPr wrap="square">
+            <a:spAutoFit/>
+          </a:bodyPr>
+          <a:lstStyle/>
+          <a:p>
+            <a:pPr defTabSz="872733">
+              <a:spcBef>
+                <a:spcPct val="50000"/>
+              </a:spcBef>
+              <a:buFont typeface="Wingdings" pitchFamily="2" charset="2"/>
+              <a:buNone/>
+            </a:pPr>
+            <a:r>
+              <a:rPr lang="en-US" sz="1500" i="1" dirty="0" err="1"/>
+              <a:t>UnmarkCommand</a:t>
+            </a:r>
+            <a:r>
+              <a:rPr lang="en-US" sz="1500" i="1" dirty="0"/>
+              <a:t>(index)</a:t>
+            </a:r>
+          </a:p>
+        </p:txBody>
+      </p:sp>
+      <p:sp>
+        <p:nvSpPr>
+          <p:cNvPr id="35" name="Text Box 11">
+            <a:extLst>
+              <a:ext uri="{FF2B5EF4-FFF2-40B4-BE49-F238E27FC236}">
+                <a16:creationId xmlns:a16="http://schemas.microsoft.com/office/drawing/2014/main" id="{31692552-B9C6-41E0-AE60-EB308C1C3253}"/>
+              </a:ext>
+            </a:extLst>
+          </p:cNvPr>
+          <p:cNvSpPr txBox="1">
+            <a:spLocks noChangeArrowheads="1"/>
+          </p:cNvSpPr>
+          <p:nvPr/>
+        </p:nvSpPr>
+        <p:spPr bwMode="auto">
+          <a:xfrm>
+            <a:off x="5183784" y="2812540"/>
+            <a:ext cx="1674216" cy="600164"/>
+          </a:xfrm>
+          <a:prstGeom prst="rect">
+            <a:avLst/>
+          </a:prstGeom>
+          <a:ln w="19050">
+            <a:headEnd/>
+            <a:tailEnd/>
+          </a:ln>
+        </p:spPr>
+        <p:style>
+          <a:lnRef idx="1">
+            <a:schemeClr val="accent3"/>
+          </a:lnRef>
+          <a:fillRef idx="2">
+            <a:schemeClr val="accent3"/>
+          </a:fillRef>
+          <a:effectRef idx="1">
+            <a:schemeClr val="accent3"/>
+          </a:effectRef>
+          <a:fontRef idx="minor">
+            <a:schemeClr val="dk1"/>
+          </a:fontRef>
+        </p:style>
+        <p:txBody>
+          <a:bodyPr wrap="square" tIns="182880" bIns="182880">
+            <a:spAutoFit/>
+          </a:bodyPr>
+          <a:lstStyle/>
+          <a:p>
+            <a:pPr algn="ctr" defTabSz="872733">
+              <a:spcBef>
+                <a:spcPct val="50000"/>
+              </a:spcBef>
+              <a:buFont typeface="Wingdings" pitchFamily="2" charset="2"/>
+              <a:buNone/>
+            </a:pPr>
+            <a:r>
+              <a:rPr lang="en-US" sz="1500" dirty="0">
+                <a:solidFill>
+                  <a:prstClr val="black"/>
+                </a:solidFill>
+              </a:rPr>
+              <a:t>:</a:t>
+            </a:r>
+            <a:r>
+              <a:rPr lang="en-US" sz="1500" dirty="0" err="1">
+                <a:solidFill>
+                  <a:prstClr val="black"/>
+                </a:solidFill>
+              </a:rPr>
+              <a:t>UnmarkCommand</a:t>
+            </a:r>
+            <a:endParaRPr lang="en-US" sz="1500" dirty="0">
+              <a:solidFill>
+                <a:prstClr val="black"/>
+              </a:solidFill>
+            </a:endParaRPr>
+          </a:p>
+        </p:txBody>
+      </p:sp>
+      <p:sp>
+        <p:nvSpPr>
+          <p:cNvPr id="37" name="Text Box 25">
+            <a:extLst>
+              <a:ext uri="{FF2B5EF4-FFF2-40B4-BE49-F238E27FC236}">
+                <a16:creationId xmlns:a16="http://schemas.microsoft.com/office/drawing/2014/main" id="{AE2A7241-B2FC-480D-B531-CE6F4EAEA5DD}"/>
+              </a:ext>
+            </a:extLst>
+          </p:cNvPr>
+          <p:cNvSpPr txBox="1">
+            <a:spLocks noChangeArrowheads="1"/>
+          </p:cNvSpPr>
+          <p:nvPr/>
+        </p:nvSpPr>
+        <p:spPr bwMode="auto">
+          <a:xfrm>
+            <a:off x="5994351" y="3993875"/>
+            <a:ext cx="2062529" cy="323165"/>
+          </a:xfrm>
+          <a:prstGeom prst="rect">
+            <a:avLst/>
+          </a:prstGeom>
+          <a:noFill/>
+          <a:ln w="12700" algn="ctr">
+            <a:noFill/>
+            <a:miter lim="800000"/>
+            <a:headEnd/>
+            <a:tailEnd/>
+          </a:ln>
+        </p:spPr>
+        <p:txBody>
+          <a:bodyPr wrap="square">
+            <a:spAutoFit/>
+          </a:bodyPr>
+          <a:lstStyle/>
+          <a:p>
+            <a:pPr defTabSz="872733">
+              <a:spcBef>
+                <a:spcPct val="50000"/>
+              </a:spcBef>
+              <a:buFont typeface="Wingdings" pitchFamily="2" charset="2"/>
+              <a:buNone/>
+            </a:pPr>
+            <a:r>
+              <a:rPr lang="en-US" sz="1500" i="1" dirty="0" err="1"/>
+              <a:t>unmarkAsBought</a:t>
+            </a:r>
+            <a:r>
+              <a:rPr lang="en-US" sz="1500" i="1" dirty="0"/>
+              <a:t>(index)</a:t>
+            </a:r>
+          </a:p>
+        </p:txBody>
+      </p:sp>
     </p:spTree>
     <p:extLst>
       <p:ext uri="{BB962C8B-B14F-4D97-AF65-F5344CB8AC3E}">
-        <p14:creationId xmlns:p14="http://schemas.microsoft.com/office/powerpoint/2010/main" val="1666434637"/>
+        <p14:creationId xmlns:p14="http://schemas.microsoft.com/office/powerpoint/2010/main" val="3751930298"/>
       </p:ext>
     </p:extLst>
   </p:cSld>
@@ -8341,7 +8529,7 @@
                                 </p:cTn>
                               </p:par>
                               <p:par>
-                                <p:cTn id="9" presetID="1" presetClass="entr" presetSubtype="0" fill="hold" grpId="0" nodeType="withEffect">
+                                <p:cTn id="9" presetID="1" presetClass="exit" presetSubtype="0" fill="hold" grpId="0" nodeType="withEffect">
                                   <p:stCondLst>
                                     <p:cond delay="0"/>
                                   </p:stCondLst>
@@ -8354,14 +8542,14 @@
                                           </p:stCondLst>
                                         </p:cTn>
                                         <p:tgtEl>
-                                          <p:spTgt spid="29"/>
+                                          <p:spTgt spid="5"/>
                                         </p:tgtEl>
                                         <p:attrNameLst>
                                           <p:attrName>style.visibility</p:attrName>
                                         </p:attrNameLst>
                                       </p:cBhvr>
                                       <p:to>
-                                        <p:strVal val="visible"/>
+                                        <p:strVal val="hidden"/>
                                       </p:to>
                                     </p:set>
                                   </p:childTnLst>
@@ -8381,7 +8569,7 @@
                                           </p:stCondLst>
                                         </p:cTn>
                                         <p:tgtEl>
-                                          <p:spTgt spid="5"/>
+                                          <p:spTgt spid="6"/>
                                         </p:tgtEl>
                                         <p:attrNameLst>
                                           <p:attrName>style.visibility</p:attrName>
@@ -8408,7 +8596,7 @@
                                           </p:stCondLst>
                                         </p:cTn>
                                         <p:tgtEl>
-                                          <p:spTgt spid="6"/>
+                                          <p:spTgt spid="19"/>
                                         </p:tgtEl>
                                         <p:attrNameLst>
                                           <p:attrName>style.visibility</p:attrName>
@@ -8435,7 +8623,7 @@
                                           </p:stCondLst>
                                         </p:cTn>
                                         <p:tgtEl>
-                                          <p:spTgt spid="17"/>
+                                          <p:spTgt spid="20"/>
                                         </p:tgtEl>
                                         <p:attrNameLst>
                                           <p:attrName>style.visibility</p:attrName>
@@ -8449,7 +8637,7 @@
                                 </p:cTn>
                               </p:par>
                               <p:par>
-                                <p:cTn id="17" presetID="1" presetClass="exit" presetSubtype="0" fill="hold" grpId="0" nodeType="withEffect">
+                                <p:cTn id="17" presetID="1" presetClass="exit" presetSubtype="0" fill="hold" grpId="1" nodeType="withEffect">
                                   <p:stCondLst>
                                     <p:cond delay="0"/>
                                   </p:stCondLst>
@@ -8462,7 +8650,7 @@
                                           </p:stCondLst>
                                         </p:cTn>
                                         <p:tgtEl>
-                                          <p:spTgt spid="18"/>
+                                          <p:spTgt spid="24"/>
                                         </p:tgtEl>
                                         <p:attrNameLst>
                                           <p:attrName>style.visibility</p:attrName>
@@ -8476,7 +8664,7 @@
                                 </p:cTn>
                               </p:par>
                               <p:par>
-                                <p:cTn id="19" presetID="1" presetClass="exit" presetSubtype="0" fill="hold" grpId="0" nodeType="withEffect">
+                                <p:cTn id="19" presetID="1" presetClass="exit" presetSubtype="0" fill="hold" grpId="1" nodeType="withEffect">
                                   <p:stCondLst>
                                     <p:cond delay="0"/>
                                   </p:stCondLst>
@@ -8489,7 +8677,7 @@
                                           </p:stCondLst>
                                         </p:cTn>
                                         <p:tgtEl>
-                                          <p:spTgt spid="19"/>
+                                          <p:spTgt spid="25"/>
                                         </p:tgtEl>
                                         <p:attrNameLst>
                                           <p:attrName>style.visibility</p:attrName>
@@ -8516,7 +8704,7 @@
                                           </p:stCondLst>
                                         </p:cTn>
                                         <p:tgtEl>
-                                          <p:spTgt spid="20"/>
+                                          <p:spTgt spid="33"/>
                                         </p:tgtEl>
                                         <p:attrNameLst>
                                           <p:attrName>style.visibility</p:attrName>
@@ -8543,141 +8731,6 @@
                                           </p:stCondLst>
                                         </p:cTn>
                                         <p:tgtEl>
-                                          <p:spTgt spid="21"/>
-                                        </p:tgtEl>
-                                        <p:attrNameLst>
-                                          <p:attrName>style.visibility</p:attrName>
-                                        </p:attrNameLst>
-                                      </p:cBhvr>
-                                      <p:to>
-                                        <p:strVal val="hidden"/>
-                                      </p:to>
-                                    </p:set>
-                                  </p:childTnLst>
-                                </p:cTn>
-                              </p:par>
-                              <p:par>
-                                <p:cTn id="25" presetID="1" presetClass="exit" presetSubtype="0" fill="hold" grpId="1" nodeType="withEffect">
-                                  <p:stCondLst>
-                                    <p:cond delay="0"/>
-                                  </p:stCondLst>
-                                  <p:childTnLst>
-                                    <p:set>
-                                      <p:cBhvr>
-                                        <p:cTn id="26" dur="1" fill="hold">
-                                          <p:stCondLst>
-                                            <p:cond delay="0"/>
-                                          </p:stCondLst>
-                                        </p:cTn>
-                                        <p:tgtEl>
-                                          <p:spTgt spid="24"/>
-                                        </p:tgtEl>
-                                        <p:attrNameLst>
-                                          <p:attrName>style.visibility</p:attrName>
-                                        </p:attrNameLst>
-                                      </p:cBhvr>
-                                      <p:to>
-                                        <p:strVal val="hidden"/>
-                                      </p:to>
-                                    </p:set>
-                                  </p:childTnLst>
-                                </p:cTn>
-                              </p:par>
-                              <p:par>
-                                <p:cTn id="27" presetID="1" presetClass="exit" presetSubtype="0" fill="hold" grpId="1" nodeType="withEffect">
-                                  <p:stCondLst>
-                                    <p:cond delay="0"/>
-                                  </p:stCondLst>
-                                  <p:childTnLst>
-                                    <p:set>
-                                      <p:cBhvr>
-                                        <p:cTn id="28" dur="1" fill="hold">
-                                          <p:stCondLst>
-                                            <p:cond delay="0"/>
-                                          </p:stCondLst>
-                                        </p:cTn>
-                                        <p:tgtEl>
-                                          <p:spTgt spid="25"/>
-                                        </p:tgtEl>
-                                        <p:attrNameLst>
-                                          <p:attrName>style.visibility</p:attrName>
-                                        </p:attrNameLst>
-                                      </p:cBhvr>
-                                      <p:to>
-                                        <p:strVal val="hidden"/>
-                                      </p:to>
-                                    </p:set>
-                                  </p:childTnLst>
-                                </p:cTn>
-                              </p:par>
-                              <p:par>
-                                <p:cTn id="29" presetID="1" presetClass="exit" presetSubtype="0" fill="hold" grpId="1" nodeType="withEffect">
-                                  <p:stCondLst>
-                                    <p:cond delay="0"/>
-                                  </p:stCondLst>
-                                  <p:childTnLst>
-                                    <p:set>
-                                      <p:cBhvr>
-                                        <p:cTn id="30" dur="1" fill="hold">
-                                          <p:stCondLst>
-                                            <p:cond delay="0"/>
-                                          </p:stCondLst>
-                                        </p:cTn>
-                                        <p:tgtEl>
-                                          <p:spTgt spid="29"/>
-                                        </p:tgtEl>
-                                        <p:attrNameLst>
-                                          <p:attrName>style.visibility</p:attrName>
-                                        </p:attrNameLst>
-                                      </p:cBhvr>
-                                      <p:to>
-                                        <p:strVal val="hidden"/>
-                                      </p:to>
-                                    </p:set>
-                                  </p:childTnLst>
-                                </p:cTn>
-                              </p:par>
-                              <p:par>
-                                <p:cTn id="31" presetID="1" presetClass="exit" presetSubtype="0" fill="hold" grpId="0" nodeType="withEffect">
-                                  <p:stCondLst>
-                                    <p:cond delay="0"/>
-                                  </p:stCondLst>
-                                  <p:childTnLst>
-                                    <p:set>
-                                      <p:cBhvr>
-                                        <p:cTn id="32" dur="1" fill="hold">
-                                          <p:stCondLst>
-                                            <p:cond delay="0"/>
-                                          </p:stCondLst>
-                                        </p:cTn>
-                                        <p:tgtEl>
-                                          <p:spTgt spid="33"/>
-                                        </p:tgtEl>
-                                        <p:attrNameLst>
-                                          <p:attrName>style.visibility</p:attrName>
-                                        </p:attrNameLst>
-                                      </p:cBhvr>
-                                      <p:to>
-                                        <p:strVal val="hidden"/>
-                                      </p:to>
-                                    </p:set>
-                                  </p:childTnLst>
-                                </p:cTn>
-                              </p:par>
-                              <p:par>
-                                <p:cTn id="33" presetID="1" presetClass="exit" presetSubtype="0" fill="hold" grpId="0" nodeType="withEffect">
-                                  <p:stCondLst>
-                                    <p:cond delay="0"/>
-                                  </p:stCondLst>
-                                  <p:childTnLst>
-                                    <p:set>
-                                      <p:cBhvr>
-                                        <p:cTn id="34" dur="1" fill="hold">
-                                          <p:stCondLst>
-                                            <p:cond delay="0"/>
-                                          </p:stCondLst>
-                                        </p:cTn>
-                                        <p:tgtEl>
                                           <p:spTgt spid="34"/>
                                         </p:tgtEl>
                                         <p:attrNameLst>
@@ -8692,14 +8745,14 @@
                                 </p:cTn>
                               </p:par>
                               <p:par>
-                                <p:cTn id="35" presetID="1" presetClass="exit" presetSubtype="0" fill="hold" grpId="0" nodeType="withEffect">
+                                <p:cTn id="25" presetID="1" presetClass="exit" presetSubtype="0" fill="hold" grpId="0" nodeType="withEffect">
                                   <p:stCondLst>
                                     <p:cond delay="0"/>
                                   </p:stCondLst>
                                   <p:childTnLst>
                                     <p:set>
                                       <p:cBhvr>
-                                        <p:cTn id="36" dur="1" fill="hold">
+                                        <p:cTn id="26" dur="1" fill="hold">
                                           <p:stCondLst>
                                             <p:cond delay="0"/>
                                           </p:stCondLst>
@@ -8719,41 +8772,14 @@
                                 </p:cTn>
                               </p:par>
                               <p:par>
-                                <p:cTn id="37" presetID="1" presetClass="exit" presetSubtype="0" fill="hold" grpId="0" nodeType="withEffect">
+                                <p:cTn id="27" presetID="1" presetClass="exit" presetSubtype="0" fill="hold" grpId="0" nodeType="withEffect">
                                   <p:stCondLst>
                                     <p:cond delay="0"/>
                                   </p:stCondLst>
                                   <p:childTnLst>
                                     <p:set>
                                       <p:cBhvr>
-                                        <p:cTn id="38" dur="1" fill="hold">
-                                          <p:stCondLst>
-                                            <p:cond delay="0"/>
-                                          </p:stCondLst>
-                                        </p:cTn>
-                                        <p:tgtEl>
-                                          <p:spTgt spid="40"/>
-                                        </p:tgtEl>
-                                        <p:attrNameLst>
-                                          <p:attrName>style.visibility</p:attrName>
-                                        </p:attrNameLst>
-                                      </p:cBhvr>
-                                      <p:to>
-                                        <p:strVal val="hidden"/>
-                                      </p:to>
-                                    </p:set>
-                                  </p:childTnLst>
-                                </p:cTn>
-                              </p:par>
-                              <p:par>
-                                <p:cTn id="39" presetID="1" presetClass="exit" presetSubtype="0" fill="hold" grpId="0" nodeType="withEffect">
-                                  <p:stCondLst>
-                                    <p:cond delay="0"/>
-                                  </p:stCondLst>
-                                  <p:childTnLst>
-                                    <p:set>
-                                      <p:cBhvr>
-                                        <p:cTn id="40" dur="1" fill="hold">
+                                        <p:cTn id="28" dur="1" fill="hold">
                                           <p:stCondLst>
                                             <p:cond delay="0"/>
                                           </p:stCondLst>
@@ -8773,7 +8799,151 @@
                                 </p:cTn>
                               </p:par>
                               <p:par>
-                                <p:cTn id="41" presetID="1" presetClass="exit" presetSubtype="0" fill="hold" grpId="0" nodeType="withEffect">
+                                <p:cTn id="29" presetID="1" presetClass="exit" presetSubtype="0" fill="hold" grpId="0" nodeType="withEffect">
+                                  <p:stCondLst>
+                                    <p:cond delay="0"/>
+                                  </p:stCondLst>
+                                  <p:childTnLst>
+                                    <p:set>
+                                      <p:cBhvr>
+                                        <p:cTn id="30" dur="1" fill="hold">
+                                          <p:stCondLst>
+                                            <p:cond delay="0"/>
+                                          </p:stCondLst>
+                                        </p:cTn>
+                                        <p:tgtEl>
+                                          <p:spTgt spid="43"/>
+                                        </p:tgtEl>
+                                        <p:attrNameLst>
+                                          <p:attrName>style.visibility</p:attrName>
+                                        </p:attrNameLst>
+                                      </p:cBhvr>
+                                      <p:to>
+                                        <p:strVal val="hidden"/>
+                                      </p:to>
+                                    </p:set>
+                                  </p:childTnLst>
+                                </p:cTn>
+                              </p:par>
+                            </p:childTnLst>
+                          </p:cTn>
+                        </p:par>
+                      </p:childTnLst>
+                    </p:cTn>
+                  </p:par>
+                  <p:par>
+                    <p:cTn id="31" fill="hold">
+                      <p:stCondLst>
+                        <p:cond delay="indefinite"/>
+                      </p:stCondLst>
+                      <p:childTnLst>
+                        <p:par>
+                          <p:cTn id="32" fill="hold">
+                            <p:stCondLst>
+                              <p:cond delay="0"/>
+                            </p:stCondLst>
+                            <p:childTnLst>
+                              <p:par>
+                                <p:cTn id="33" presetID="1" presetClass="entr" presetSubtype="0" fill="hold" grpId="0" nodeType="clickEffect">
+                                  <p:stCondLst>
+                                    <p:cond delay="0"/>
+                                  </p:stCondLst>
+                                  <p:childTnLst>
+                                    <p:set>
+                                      <p:cBhvr>
+                                        <p:cTn id="34" dur="1" fill="hold">
+                                          <p:stCondLst>
+                                            <p:cond delay="0"/>
+                                          </p:stCondLst>
+                                        </p:cTn>
+                                        <p:tgtEl>
+                                          <p:spTgt spid="45"/>
+                                        </p:tgtEl>
+                                        <p:attrNameLst>
+                                          <p:attrName>style.visibility</p:attrName>
+                                        </p:attrNameLst>
+                                      </p:cBhvr>
+                                      <p:to>
+                                        <p:strVal val="visible"/>
+                                      </p:to>
+                                    </p:set>
+                                  </p:childTnLst>
+                                </p:cTn>
+                              </p:par>
+                              <p:par>
+                                <p:cTn id="35" presetID="1" presetClass="exit" presetSubtype="0" fill="hold" grpId="1" nodeType="withEffect">
+                                  <p:stCondLst>
+                                    <p:cond delay="0"/>
+                                  </p:stCondLst>
+                                  <p:childTnLst>
+                                    <p:set>
+                                      <p:cBhvr>
+                                        <p:cTn id="36" dur="1" fill="hold">
+                                          <p:stCondLst>
+                                            <p:cond delay="0"/>
+                                          </p:stCondLst>
+                                        </p:cTn>
+                                        <p:tgtEl>
+                                          <p:spTgt spid="45"/>
+                                        </p:tgtEl>
+                                        <p:attrNameLst>
+                                          <p:attrName>style.visibility</p:attrName>
+                                        </p:attrNameLst>
+                                      </p:cBhvr>
+                                      <p:to>
+                                        <p:strVal val="hidden"/>
+                                      </p:to>
+                                    </p:set>
+                                  </p:childTnLst>
+                                </p:cTn>
+                              </p:par>
+                            </p:childTnLst>
+                          </p:cTn>
+                        </p:par>
+                      </p:childTnLst>
+                    </p:cTn>
+                  </p:par>
+                  <p:par>
+                    <p:cTn id="37" fill="hold">
+                      <p:stCondLst>
+                        <p:cond delay="indefinite"/>
+                      </p:stCondLst>
+                      <p:childTnLst>
+                        <p:par>
+                          <p:cTn id="38" fill="hold">
+                            <p:stCondLst>
+                              <p:cond delay="0"/>
+                            </p:stCondLst>
+                            <p:childTnLst>
+                              <p:par>
+                                <p:cTn id="39" presetID="1" presetClass="entr" presetSubtype="0" fill="hold" grpId="0" nodeType="clickEffect">
+                                  <p:stCondLst>
+                                    <p:cond delay="0"/>
+                                  </p:stCondLst>
+                                  <p:childTnLst>
+                                    <p:set>
+                                      <p:cBhvr>
+                                        <p:cTn id="40" dur="1" fill="hold">
+                                          <p:stCondLst>
+                                            <p:cond delay="0"/>
+                                          </p:stCondLst>
+                                        </p:cTn>
+                                        <p:tgtEl>
+                                          <p:spTgt spid="46"/>
+                                        </p:tgtEl>
+                                        <p:attrNameLst>
+                                          <p:attrName>style.visibility</p:attrName>
+                                        </p:attrNameLst>
+                                      </p:cBhvr>
+                                      <p:to>
+                                        <p:strVal val="visible"/>
+                                      </p:to>
+                                    </p:set>
+                                  </p:childTnLst>
+                                </p:cTn>
+                              </p:par>
+                              <p:par>
+                                <p:cTn id="41" presetID="1" presetClass="exit" presetSubtype="0" fill="hold" grpId="1" nodeType="withEffect">
                                   <p:stCondLst>
                                     <p:cond delay="0"/>
                                   </p:stCondLst>
@@ -8786,7 +8956,7 @@
                                           </p:stCondLst>
                                         </p:cTn>
                                         <p:tgtEl>
-                                          <p:spTgt spid="43"/>
+                                          <p:spTgt spid="46"/>
                                         </p:tgtEl>
                                         <p:attrNameLst>
                                           <p:attrName>style.visibility</p:attrName>
@@ -8813,7 +8983,7 @@
                                           </p:stCondLst>
                                         </p:cTn>
                                         <p:tgtEl>
-                                          <p:spTgt spid="44"/>
+                                          <p:spTgt spid="48"/>
                                         </p:tgtEl>
                                         <p:attrNameLst>
                                           <p:attrName>style.visibility</p:attrName>
@@ -8826,39 +8996,21 @@
                                   </p:childTnLst>
                                 </p:cTn>
                               </p:par>
-                            </p:childTnLst>
-                          </p:cTn>
-                        </p:par>
-                      </p:childTnLst>
-                    </p:cTn>
-                  </p:par>
-                  <p:par>
-                    <p:cTn id="45" fill="hold">
-                      <p:stCondLst>
-                        <p:cond delay="indefinite"/>
-                      </p:stCondLst>
-                      <p:childTnLst>
-                        <p:par>
-                          <p:cTn id="46" fill="hold">
-                            <p:stCondLst>
-                              <p:cond delay="0"/>
-                            </p:stCondLst>
-                            <p:childTnLst>
                               <p:par>
-                                <p:cTn id="47" presetID="1" presetClass="entr" presetSubtype="0" fill="hold" grpId="0" nodeType="clickEffect">
+                                <p:cTn id="45" presetID="1" presetClass="entr" presetSubtype="0" fill="hold" grpId="0" nodeType="withEffect">
                                   <p:stCondLst>
                                     <p:cond delay="0"/>
                                   </p:stCondLst>
                                   <p:childTnLst>
                                     <p:set>
                                       <p:cBhvr>
-                                        <p:cTn id="48" dur="1" fill="hold">
+                                        <p:cTn id="46" dur="1" fill="hold">
                                           <p:stCondLst>
                                             <p:cond delay="0"/>
                                           </p:stCondLst>
                                         </p:cTn>
                                         <p:tgtEl>
-                                          <p:spTgt spid="45"/>
+                                          <p:spTgt spid="51"/>
                                         </p:tgtEl>
                                         <p:attrNameLst>
                                           <p:attrName>style.visibility</p:attrName>
@@ -8872,7 +9024,34 @@
                                 </p:cTn>
                               </p:par>
                               <p:par>
-                                <p:cTn id="49" presetID="1" presetClass="exit" presetSubtype="0" fill="hold" grpId="1" nodeType="withEffect">
+                                <p:cTn id="47" presetID="1" presetClass="exit" presetSubtype="0" fill="hold" grpId="1" nodeType="withEffect">
+                                  <p:stCondLst>
+                                    <p:cond delay="0"/>
+                                  </p:stCondLst>
+                                  <p:childTnLst>
+                                    <p:set>
+                                      <p:cBhvr>
+                                        <p:cTn id="48" dur="1" fill="hold">
+                                          <p:stCondLst>
+                                            <p:cond delay="0"/>
+                                          </p:stCondLst>
+                                        </p:cTn>
+                                        <p:tgtEl>
+                                          <p:spTgt spid="51"/>
+                                        </p:tgtEl>
+                                        <p:attrNameLst>
+                                          <p:attrName>style.visibility</p:attrName>
+                                        </p:attrNameLst>
+                                      </p:cBhvr>
+                                      <p:to>
+                                        <p:strVal val="hidden"/>
+                                      </p:to>
+                                    </p:set>
+                                  </p:childTnLst>
+                                </p:cTn>
+                              </p:par>
+                              <p:par>
+                                <p:cTn id="49" presetID="1" presetClass="exit" presetSubtype="0" fill="hold" grpId="0" nodeType="withEffect">
                                   <p:stCondLst>
                                     <p:cond delay="0"/>
                                   </p:stCondLst>
@@ -8885,7 +9064,7 @@
                                           </p:stCondLst>
                                         </p:cTn>
                                         <p:tgtEl>
-                                          <p:spTgt spid="45"/>
+                                          <p:spTgt spid="52"/>
                                         </p:tgtEl>
                                         <p:attrNameLst>
                                           <p:attrName>style.visibility</p:attrName>
@@ -8930,7 +9109,7 @@
                                           </p:stCondLst>
                                         </p:cTn>
                                         <p:tgtEl>
-                                          <p:spTgt spid="46"/>
+                                          <p:spTgt spid="30"/>
                                         </p:tgtEl>
                                         <p:attrNameLst>
                                           <p:attrName>style.visibility</p:attrName>
@@ -8957,7 +9136,7 @@
                                           </p:stCondLst>
                                         </p:cTn>
                                         <p:tgtEl>
-                                          <p:spTgt spid="46"/>
+                                          <p:spTgt spid="30"/>
                                         </p:tgtEl>
                                         <p:attrNameLst>
                                           <p:attrName>style.visibility</p:attrName>
@@ -8970,21 +9149,39 @@
                                   </p:childTnLst>
                                 </p:cTn>
                               </p:par>
+                            </p:childTnLst>
+                          </p:cTn>
+                        </p:par>
+                      </p:childTnLst>
+                    </p:cTn>
+                  </p:par>
+                  <p:par>
+                    <p:cTn id="57" fill="hold">
+                      <p:stCondLst>
+                        <p:cond delay="indefinite"/>
+                      </p:stCondLst>
+                      <p:childTnLst>
+                        <p:par>
+                          <p:cTn id="58" fill="hold">
+                            <p:stCondLst>
+                              <p:cond delay="0"/>
+                            </p:stCondLst>
+                            <p:childTnLst>
                               <p:par>
-                                <p:cTn id="57" presetID="1" presetClass="entr" presetSubtype="0" fill="hold" grpId="0" nodeType="withEffect">
+                                <p:cTn id="59" presetID="1" presetClass="entr" presetSubtype="0" fill="hold" grpId="0" nodeType="clickEffect">
                                   <p:stCondLst>
                                     <p:cond delay="0"/>
                                   </p:stCondLst>
                                   <p:childTnLst>
                                     <p:set>
                                       <p:cBhvr>
-                                        <p:cTn id="58" dur="1" fill="hold">
+                                        <p:cTn id="60" dur="1" fill="hold">
                                           <p:stCondLst>
                                             <p:cond delay="0"/>
                                           </p:stCondLst>
                                         </p:cTn>
                                         <p:tgtEl>
-                                          <p:spTgt spid="47"/>
+                                          <p:spTgt spid="31"/>
                                         </p:tgtEl>
                                         <p:attrNameLst>
                                           <p:attrName>style.visibility</p:attrName>
@@ -8998,34 +9195,7 @@
                                 </p:cTn>
                               </p:par>
                               <p:par>
-                                <p:cTn id="59" presetID="1" presetClass="exit" presetSubtype="0" fill="hold" grpId="1" nodeType="withEffect">
-                                  <p:stCondLst>
-                                    <p:cond delay="0"/>
-                                  </p:stCondLst>
-                                  <p:childTnLst>
-                                    <p:set>
-                                      <p:cBhvr>
-                                        <p:cTn id="60" dur="1" fill="hold">
-                                          <p:stCondLst>
-                                            <p:cond delay="0"/>
-                                          </p:stCondLst>
-                                        </p:cTn>
-                                        <p:tgtEl>
-                                          <p:spTgt spid="47"/>
-                                        </p:tgtEl>
-                                        <p:attrNameLst>
-                                          <p:attrName>style.visibility</p:attrName>
-                                        </p:attrNameLst>
-                                      </p:cBhvr>
-                                      <p:to>
-                                        <p:strVal val="hidden"/>
-                                      </p:to>
-                                    </p:set>
-                                  </p:childTnLst>
-                                </p:cTn>
-                              </p:par>
-                              <p:par>
-                                <p:cTn id="61" presetID="1" presetClass="exit" presetSubtype="0" fill="hold" grpId="0" nodeType="withEffect">
+                                <p:cTn id="61" presetID="1" presetClass="exit" presetSubtype="0" fill="hold" grpId="1" nodeType="withEffect">
                                   <p:stCondLst>
                                     <p:cond delay="0"/>
                                   </p:stCondLst>
@@ -9038,7 +9208,7 @@
                                           </p:stCondLst>
                                         </p:cTn>
                                         <p:tgtEl>
-                                          <p:spTgt spid="48"/>
+                                          <p:spTgt spid="31"/>
                                         </p:tgtEl>
                                         <p:attrNameLst>
                                           <p:attrName>style.visibility</p:attrName>
@@ -9065,7 +9235,7 @@
                                           </p:stCondLst>
                                         </p:cTn>
                                         <p:tgtEl>
-                                          <p:spTgt spid="51"/>
+                                          <p:spTgt spid="28"/>
                                         </p:tgtEl>
                                         <p:attrNameLst>
                                           <p:attrName>style.visibility</p:attrName>
@@ -9092,7 +9262,7 @@
                                           </p:stCondLst>
                                         </p:cTn>
                                         <p:tgtEl>
-                                          <p:spTgt spid="51"/>
+                                          <p:spTgt spid="28"/>
                                         </p:tgtEl>
                                         <p:attrNameLst>
                                           <p:attrName>style.visibility</p:attrName>
@@ -9106,7 +9276,7 @@
                                 </p:cTn>
                               </p:par>
                               <p:par>
-                                <p:cTn id="67" presetID="1" presetClass="exit" presetSubtype="0" fill="hold" grpId="0" nodeType="withEffect">
+                                <p:cTn id="67" presetID="1" presetClass="entr" presetSubtype="0" fill="hold" grpId="0" nodeType="withEffect">
                                   <p:stCondLst>
                                     <p:cond delay="0"/>
                                   </p:stCondLst>
@@ -9119,7 +9289,34 @@
                                           </p:stCondLst>
                                         </p:cTn>
                                         <p:tgtEl>
-                                          <p:spTgt spid="52"/>
+                                          <p:spTgt spid="32"/>
+                                        </p:tgtEl>
+                                        <p:attrNameLst>
+                                          <p:attrName>style.visibility</p:attrName>
+                                        </p:attrNameLst>
+                                      </p:cBhvr>
+                                      <p:to>
+                                        <p:strVal val="visible"/>
+                                      </p:to>
+                                    </p:set>
+                                  </p:childTnLst>
+                                </p:cTn>
+                              </p:par>
+                              <p:par>
+                                <p:cTn id="69" presetID="1" presetClass="exit" presetSubtype="0" fill="hold" grpId="1" nodeType="withEffect">
+                                  <p:stCondLst>
+                                    <p:cond delay="0"/>
+                                  </p:stCondLst>
+                                  <p:childTnLst>
+                                    <p:set>
+                                      <p:cBhvr>
+                                        <p:cTn id="70" dur="1" fill="hold">
+                                          <p:stCondLst>
+                                            <p:cond delay="0"/>
+                                          </p:stCondLst>
+                                        </p:cTn>
+                                        <p:tgtEl>
+                                          <p:spTgt spid="32"/>
                                         </p:tgtEl>
                                         <p:attrNameLst>
                                           <p:attrName>style.visibility</p:attrName>
@@ -9133,20 +9330,47 @@
                                 </p:cTn>
                               </p:par>
                               <p:par>
-                                <p:cTn id="69" presetID="1" presetClass="exit" presetSubtype="0" fill="hold" grpId="0" nodeType="withEffect">
+                                <p:cTn id="71" presetID="1" presetClass="exit" presetSubtype="0" fill="hold" grpId="0" nodeType="withEffect">
                                   <p:stCondLst>
                                     <p:cond delay="0"/>
                                   </p:stCondLst>
                                   <p:childTnLst>
                                     <p:set>
                                       <p:cBhvr>
-                                        <p:cTn id="70" dur="1" fill="hold">
+                                        <p:cTn id="72" dur="1" fill="hold">
                                           <p:stCondLst>
                                             <p:cond delay="0"/>
                                           </p:stCondLst>
                                         </p:cTn>
                                         <p:tgtEl>
-                                          <p:spTgt spid="53"/>
+                                          <p:spTgt spid="35"/>
+                                        </p:tgtEl>
+                                        <p:attrNameLst>
+                                          <p:attrName>style.visibility</p:attrName>
+                                        </p:attrNameLst>
+                                      </p:cBhvr>
+                                      <p:to>
+                                        <p:strVal val="hidden"/>
+                                      </p:to>
+                                    </p:set>
+                                  </p:childTnLst>
+                                </p:cTn>
+                              </p:par>
+                              <p:par>
+                                <p:cTn id="73" presetID="1" presetClass="exit" presetSubtype="0" fill="hold" grpId="0" nodeType="withEffect">
+                                  <p:stCondLst>
+                                    <p:cond delay="0"/>
+                                  </p:stCondLst>
+                                  <p:childTnLst>
+                                    <p:set>
+                                      <p:cBhvr>
+                                        <p:cTn id="74" dur="1" fill="hold">
+                                          <p:stCondLst>
+                                            <p:cond delay="0"/>
+                                          </p:stCondLst>
+                                        </p:cTn>
+                                        <p:tgtEl>
+                                          <p:spTgt spid="37"/>
                                         </p:tgtEl>
                                         <p:attrNameLst>
                                           <p:attrName>style.visibility</p:attrName>
@@ -9189,35 +9413,35 @@
     <p:bldLst>
       <p:bldP spid="5" grpId="0" animBg="1"/>
       <p:bldP spid="6" grpId="0" animBg="1"/>
-      <p:bldP spid="17" grpId="0" animBg="1"/>
-      <p:bldP spid="18" grpId="0" animBg="1"/>
       <p:bldP spid="19" grpId="0" animBg="1"/>
       <p:bldP spid="20" grpId="0" animBg="1"/>
-      <p:bldP spid="21" grpId="0"/>
       <p:bldP spid="24" grpId="0" animBg="1"/>
       <p:bldP spid="24" grpId="1" animBg="1"/>
       <p:bldP spid="25" grpId="0"/>
       <p:bldP spid="25" grpId="1"/>
-      <p:bldP spid="29" grpId="0"/>
-      <p:bldP spid="29" grpId="1"/>
       <p:bldP spid="33" grpId="0" animBg="1"/>
       <p:bldP spid="34" grpId="0" animBg="1"/>
       <p:bldP spid="38" grpId="0"/>
-      <p:bldP spid="40" grpId="0" animBg="1"/>
       <p:bldP spid="42" grpId="0" animBg="1"/>
       <p:bldP spid="43" grpId="0" animBg="1"/>
-      <p:bldP spid="44" grpId="0" animBg="1"/>
       <p:bldP spid="45" grpId="0" animBg="1"/>
       <p:bldP spid="45" grpId="1" animBg="1"/>
       <p:bldP spid="46" grpId="0" animBg="1"/>
       <p:bldP spid="46" grpId="1" animBg="1"/>
-      <p:bldP spid="47" grpId="0"/>
-      <p:bldP spid="47" grpId="1"/>
       <p:bldP spid="48" grpId="0" animBg="1"/>
       <p:bldP spid="51" grpId="0"/>
       <p:bldP spid="51" grpId="1"/>
       <p:bldP spid="52" grpId="0" animBg="1"/>
-      <p:bldP spid="53" grpId="0" animBg="1"/>
+      <p:bldP spid="30" grpId="0" animBg="1"/>
+      <p:bldP spid="30" grpId="1" animBg="1"/>
+      <p:bldP spid="31" grpId="0" animBg="1"/>
+      <p:bldP spid="31" grpId="1" animBg="1"/>
+      <p:bldP spid="28" grpId="0"/>
+      <p:bldP spid="28" grpId="1"/>
+      <p:bldP spid="32" grpId="0"/>
+      <p:bldP spid="32" grpId="1"/>
+      <p:bldP spid="35" grpId="0" animBg="1"/>
+      <p:bldP spid="37" grpId="0"/>
     </p:bldLst>
   </p:timing>
 </p:sld>

</xml_diff>